<commit_message>
shared reward & mid
SR: instructions and button boss correction. MID: cleaning up misc files
</commit_message>
<xml_diff>
--- a/sharedreward/Instructions.pptx
+++ b/sharedreward/Instructions.pptx
@@ -6,16 +6,15 @@
   </p:sldMasterIdLst>
   <p:sldIdLst>
     <p:sldId id="256" r:id="rId2"/>
-    <p:sldId id="257" r:id="rId3"/>
-    <p:sldId id="262" r:id="rId4"/>
-    <p:sldId id="263" r:id="rId5"/>
-    <p:sldId id="264" r:id="rId6"/>
-    <p:sldId id="260" r:id="rId7"/>
-    <p:sldId id="265" r:id="rId8"/>
-    <p:sldId id="258" r:id="rId9"/>
-    <p:sldId id="259" r:id="rId10"/>
-    <p:sldId id="261" r:id="rId11"/>
-    <p:sldId id="266" r:id="rId12"/>
+    <p:sldId id="262" r:id="rId3"/>
+    <p:sldId id="263" r:id="rId4"/>
+    <p:sldId id="264" r:id="rId5"/>
+    <p:sldId id="260" r:id="rId6"/>
+    <p:sldId id="265" r:id="rId7"/>
+    <p:sldId id="258" r:id="rId8"/>
+    <p:sldId id="259" r:id="rId9"/>
+    <p:sldId id="261" r:id="rId10"/>
+    <p:sldId id="266" r:id="rId11"/>
   </p:sldIdLst>
   <p:sldSz cx="12192000" cy="6858000"/>
   <p:notesSz cx="6858000" cy="9144000"/>
@@ -164,7 +163,7 @@
           </a:lstStyle>
           <a:p>
             <a:r>
-              <a:rPr lang="en-US" smtClean="0"/>
+              <a:rPr lang="en-US"/>
               <a:t>Click to edit Master title style</a:t>
             </a:r>
             <a:endParaRPr lang="en-US" dirty="0"/>
@@ -229,7 +228,7 @@
           </a:lstStyle>
           <a:p>
             <a:r>
-              <a:rPr lang="en-US" smtClean="0"/>
+              <a:rPr lang="en-US"/>
               <a:t>Click to edit Master subtitle style</a:t>
             </a:r>
             <a:endParaRPr lang="en-US" dirty="0"/>
@@ -253,7 +252,7 @@
           <a:p>
             <a:fld id="{DD486318-9DF8-4AB8-B4FE-404675D97C09}" type="datetimeFigureOut">
               <a:rPr lang="en-US" smtClean="0"/>
-              <a:t>2/18/2022</a:t>
+              <a:t>1/29/2025</a:t>
             </a:fld>
             <a:endParaRPr lang="en-US"/>
           </a:p>
@@ -347,7 +346,7 @@
           <a:lstStyle/>
           <a:p>
             <a:r>
-              <a:rPr lang="en-US" smtClean="0"/>
+              <a:rPr lang="en-US"/>
               <a:t>Click to edit Master title style</a:t>
             </a:r>
             <a:endParaRPr lang="en-US" dirty="0"/>
@@ -371,35 +370,35 @@
           <a:p>
             <a:pPr lvl="0"/>
             <a:r>
-              <a:rPr lang="en-US" smtClean="0"/>
+              <a:rPr lang="en-US"/>
               <a:t>Edit Master text styles</a:t>
             </a:r>
           </a:p>
           <a:p>
             <a:pPr lvl="1"/>
             <a:r>
-              <a:rPr lang="en-US" smtClean="0"/>
+              <a:rPr lang="en-US"/>
               <a:t>Second level</a:t>
             </a:r>
           </a:p>
           <a:p>
             <a:pPr lvl="2"/>
             <a:r>
-              <a:rPr lang="en-US" smtClean="0"/>
+              <a:rPr lang="en-US"/>
               <a:t>Third level</a:t>
             </a:r>
           </a:p>
           <a:p>
             <a:pPr lvl="3"/>
             <a:r>
-              <a:rPr lang="en-US" smtClean="0"/>
+              <a:rPr lang="en-US"/>
               <a:t>Fourth level</a:t>
             </a:r>
           </a:p>
           <a:p>
             <a:pPr lvl="4"/>
             <a:r>
-              <a:rPr lang="en-US" smtClean="0"/>
+              <a:rPr lang="en-US"/>
               <a:t>Fifth level</a:t>
             </a:r>
             <a:endParaRPr lang="en-US" dirty="0"/>
@@ -423,7 +422,7 @@
           <a:p>
             <a:fld id="{DD486318-9DF8-4AB8-B4FE-404675D97C09}" type="datetimeFigureOut">
               <a:rPr lang="en-US" smtClean="0"/>
-              <a:t>2/18/2022</a:t>
+              <a:t>1/29/2025</a:t>
             </a:fld>
             <a:endParaRPr lang="en-US"/>
           </a:p>
@@ -522,7 +521,7 @@
           <a:lstStyle/>
           <a:p>
             <a:r>
-              <a:rPr lang="en-US" smtClean="0"/>
+              <a:rPr lang="en-US"/>
               <a:t>Click to edit Master title style</a:t>
             </a:r>
             <a:endParaRPr lang="en-US" dirty="0"/>
@@ -551,35 +550,35 @@
           <a:p>
             <a:pPr lvl="0"/>
             <a:r>
-              <a:rPr lang="en-US" smtClean="0"/>
+              <a:rPr lang="en-US"/>
               <a:t>Edit Master text styles</a:t>
             </a:r>
           </a:p>
           <a:p>
             <a:pPr lvl="1"/>
             <a:r>
-              <a:rPr lang="en-US" smtClean="0"/>
+              <a:rPr lang="en-US"/>
               <a:t>Second level</a:t>
             </a:r>
           </a:p>
           <a:p>
             <a:pPr lvl="2"/>
             <a:r>
-              <a:rPr lang="en-US" smtClean="0"/>
+              <a:rPr lang="en-US"/>
               <a:t>Third level</a:t>
             </a:r>
           </a:p>
           <a:p>
             <a:pPr lvl="3"/>
             <a:r>
-              <a:rPr lang="en-US" smtClean="0"/>
+              <a:rPr lang="en-US"/>
               <a:t>Fourth level</a:t>
             </a:r>
           </a:p>
           <a:p>
             <a:pPr lvl="4"/>
             <a:r>
-              <a:rPr lang="en-US" smtClean="0"/>
+              <a:rPr lang="en-US"/>
               <a:t>Fifth level</a:t>
             </a:r>
             <a:endParaRPr lang="en-US" dirty="0"/>
@@ -603,7 +602,7 @@
           <a:p>
             <a:fld id="{DD486318-9DF8-4AB8-B4FE-404675D97C09}" type="datetimeFigureOut">
               <a:rPr lang="en-US" smtClean="0"/>
-              <a:t>2/18/2022</a:t>
+              <a:t>1/29/2025</a:t>
             </a:fld>
             <a:endParaRPr lang="en-US"/>
           </a:p>
@@ -697,7 +696,7 @@
           <a:lstStyle/>
           <a:p>
             <a:r>
-              <a:rPr lang="en-US" smtClean="0"/>
+              <a:rPr lang="en-US"/>
               <a:t>Click to edit Master title style</a:t>
             </a:r>
             <a:endParaRPr lang="en-US" dirty="0"/>
@@ -721,35 +720,35 @@
           <a:p>
             <a:pPr lvl="0"/>
             <a:r>
-              <a:rPr lang="en-US" smtClean="0"/>
+              <a:rPr lang="en-US"/>
               <a:t>Edit Master text styles</a:t>
             </a:r>
           </a:p>
           <a:p>
             <a:pPr lvl="1"/>
             <a:r>
-              <a:rPr lang="en-US" smtClean="0"/>
+              <a:rPr lang="en-US"/>
               <a:t>Second level</a:t>
             </a:r>
           </a:p>
           <a:p>
             <a:pPr lvl="2"/>
             <a:r>
-              <a:rPr lang="en-US" smtClean="0"/>
+              <a:rPr lang="en-US"/>
               <a:t>Third level</a:t>
             </a:r>
           </a:p>
           <a:p>
             <a:pPr lvl="3"/>
             <a:r>
-              <a:rPr lang="en-US" smtClean="0"/>
+              <a:rPr lang="en-US"/>
               <a:t>Fourth level</a:t>
             </a:r>
           </a:p>
           <a:p>
             <a:pPr lvl="4"/>
             <a:r>
-              <a:rPr lang="en-US" smtClean="0"/>
+              <a:rPr lang="en-US"/>
               <a:t>Fifth level</a:t>
             </a:r>
             <a:endParaRPr lang="en-US" dirty="0"/>
@@ -773,7 +772,7 @@
           <a:p>
             <a:fld id="{DD486318-9DF8-4AB8-B4FE-404675D97C09}" type="datetimeFigureOut">
               <a:rPr lang="en-US" smtClean="0"/>
-              <a:t>2/18/2022</a:t>
+              <a:t>1/29/2025</a:t>
             </a:fld>
             <a:endParaRPr lang="en-US"/>
           </a:p>
@@ -876,7 +875,7 @@
           </a:lstStyle>
           <a:p>
             <a:r>
-              <a:rPr lang="en-US" smtClean="0"/>
+              <a:rPr lang="en-US"/>
               <a:t>Click to edit Master title style</a:t>
             </a:r>
             <a:endParaRPr lang="en-US" dirty="0"/>
@@ -996,7 +995,7 @@
           <a:p>
             <a:pPr lvl="0"/>
             <a:r>
-              <a:rPr lang="en-US" smtClean="0"/>
+              <a:rPr lang="en-US"/>
               <a:t>Edit Master text styles</a:t>
             </a:r>
           </a:p>
@@ -1019,7 +1018,7 @@
           <a:p>
             <a:fld id="{DD486318-9DF8-4AB8-B4FE-404675D97C09}" type="datetimeFigureOut">
               <a:rPr lang="en-US" smtClean="0"/>
-              <a:t>2/18/2022</a:t>
+              <a:t>1/29/2025</a:t>
             </a:fld>
             <a:endParaRPr lang="en-US"/>
           </a:p>
@@ -1113,7 +1112,7 @@
           <a:lstStyle/>
           <a:p>
             <a:r>
-              <a:rPr lang="en-US" smtClean="0"/>
+              <a:rPr lang="en-US"/>
               <a:t>Click to edit Master title style</a:t>
             </a:r>
             <a:endParaRPr lang="en-US" dirty="0"/>
@@ -1142,35 +1141,35 @@
           <a:p>
             <a:pPr lvl="0"/>
             <a:r>
-              <a:rPr lang="en-US" smtClean="0"/>
+              <a:rPr lang="en-US"/>
               <a:t>Edit Master text styles</a:t>
             </a:r>
           </a:p>
           <a:p>
             <a:pPr lvl="1"/>
             <a:r>
-              <a:rPr lang="en-US" smtClean="0"/>
+              <a:rPr lang="en-US"/>
               <a:t>Second level</a:t>
             </a:r>
           </a:p>
           <a:p>
             <a:pPr lvl="2"/>
             <a:r>
-              <a:rPr lang="en-US" smtClean="0"/>
+              <a:rPr lang="en-US"/>
               <a:t>Third level</a:t>
             </a:r>
           </a:p>
           <a:p>
             <a:pPr lvl="3"/>
             <a:r>
-              <a:rPr lang="en-US" smtClean="0"/>
+              <a:rPr lang="en-US"/>
               <a:t>Fourth level</a:t>
             </a:r>
           </a:p>
           <a:p>
             <a:pPr lvl="4"/>
             <a:r>
-              <a:rPr lang="en-US" smtClean="0"/>
+              <a:rPr lang="en-US"/>
               <a:t>Fifth level</a:t>
             </a:r>
             <a:endParaRPr lang="en-US" dirty="0"/>
@@ -1199,35 +1198,35 @@
           <a:p>
             <a:pPr lvl="0"/>
             <a:r>
-              <a:rPr lang="en-US" smtClean="0"/>
+              <a:rPr lang="en-US"/>
               <a:t>Edit Master text styles</a:t>
             </a:r>
           </a:p>
           <a:p>
             <a:pPr lvl="1"/>
             <a:r>
-              <a:rPr lang="en-US" smtClean="0"/>
+              <a:rPr lang="en-US"/>
               <a:t>Second level</a:t>
             </a:r>
           </a:p>
           <a:p>
             <a:pPr lvl="2"/>
             <a:r>
-              <a:rPr lang="en-US" smtClean="0"/>
+              <a:rPr lang="en-US"/>
               <a:t>Third level</a:t>
             </a:r>
           </a:p>
           <a:p>
             <a:pPr lvl="3"/>
             <a:r>
-              <a:rPr lang="en-US" smtClean="0"/>
+              <a:rPr lang="en-US"/>
               <a:t>Fourth level</a:t>
             </a:r>
           </a:p>
           <a:p>
             <a:pPr lvl="4"/>
             <a:r>
-              <a:rPr lang="en-US" smtClean="0"/>
+              <a:rPr lang="en-US"/>
               <a:t>Fifth level</a:t>
             </a:r>
             <a:endParaRPr lang="en-US" dirty="0"/>
@@ -1251,7 +1250,7 @@
           <a:p>
             <a:fld id="{DD486318-9DF8-4AB8-B4FE-404675D97C09}" type="datetimeFigureOut">
               <a:rPr lang="en-US" smtClean="0"/>
-              <a:t>2/18/2022</a:t>
+              <a:t>1/29/2025</a:t>
             </a:fld>
             <a:endParaRPr lang="en-US"/>
           </a:p>
@@ -1350,7 +1349,7 @@
           <a:lstStyle/>
           <a:p>
             <a:r>
-              <a:rPr lang="en-US" smtClean="0"/>
+              <a:rPr lang="en-US"/>
               <a:t>Click to edit Master title style</a:t>
             </a:r>
             <a:endParaRPr lang="en-US" dirty="0"/>
@@ -1416,7 +1415,7 @@
           <a:p>
             <a:pPr lvl="0"/>
             <a:r>
-              <a:rPr lang="en-US" smtClean="0"/>
+              <a:rPr lang="en-US"/>
               <a:t>Edit Master text styles</a:t>
             </a:r>
           </a:p>
@@ -1444,35 +1443,35 @@
           <a:p>
             <a:pPr lvl="0"/>
             <a:r>
-              <a:rPr lang="en-US" smtClean="0"/>
+              <a:rPr lang="en-US"/>
               <a:t>Edit Master text styles</a:t>
             </a:r>
           </a:p>
           <a:p>
             <a:pPr lvl="1"/>
             <a:r>
-              <a:rPr lang="en-US" smtClean="0"/>
+              <a:rPr lang="en-US"/>
               <a:t>Second level</a:t>
             </a:r>
           </a:p>
           <a:p>
             <a:pPr lvl="2"/>
             <a:r>
-              <a:rPr lang="en-US" smtClean="0"/>
+              <a:rPr lang="en-US"/>
               <a:t>Third level</a:t>
             </a:r>
           </a:p>
           <a:p>
             <a:pPr lvl="3"/>
             <a:r>
-              <a:rPr lang="en-US" smtClean="0"/>
+              <a:rPr lang="en-US"/>
               <a:t>Fourth level</a:t>
             </a:r>
           </a:p>
           <a:p>
             <a:pPr lvl="4"/>
             <a:r>
-              <a:rPr lang="en-US" smtClean="0"/>
+              <a:rPr lang="en-US"/>
               <a:t>Fifth level</a:t>
             </a:r>
             <a:endParaRPr lang="en-US" dirty="0"/>
@@ -1538,7 +1537,7 @@
           <a:p>
             <a:pPr lvl="0"/>
             <a:r>
-              <a:rPr lang="en-US" smtClean="0"/>
+              <a:rPr lang="en-US"/>
               <a:t>Edit Master text styles</a:t>
             </a:r>
           </a:p>
@@ -1566,35 +1565,35 @@
           <a:p>
             <a:pPr lvl="0"/>
             <a:r>
-              <a:rPr lang="en-US" smtClean="0"/>
+              <a:rPr lang="en-US"/>
               <a:t>Edit Master text styles</a:t>
             </a:r>
           </a:p>
           <a:p>
             <a:pPr lvl="1"/>
             <a:r>
-              <a:rPr lang="en-US" smtClean="0"/>
+              <a:rPr lang="en-US"/>
               <a:t>Second level</a:t>
             </a:r>
           </a:p>
           <a:p>
             <a:pPr lvl="2"/>
             <a:r>
-              <a:rPr lang="en-US" smtClean="0"/>
+              <a:rPr lang="en-US"/>
               <a:t>Third level</a:t>
             </a:r>
           </a:p>
           <a:p>
             <a:pPr lvl="3"/>
             <a:r>
-              <a:rPr lang="en-US" smtClean="0"/>
+              <a:rPr lang="en-US"/>
               <a:t>Fourth level</a:t>
             </a:r>
           </a:p>
           <a:p>
             <a:pPr lvl="4"/>
             <a:r>
-              <a:rPr lang="en-US" smtClean="0"/>
+              <a:rPr lang="en-US"/>
               <a:t>Fifth level</a:t>
             </a:r>
             <a:endParaRPr lang="en-US" dirty="0"/>
@@ -1618,7 +1617,7 @@
           <a:p>
             <a:fld id="{DD486318-9DF8-4AB8-B4FE-404675D97C09}" type="datetimeFigureOut">
               <a:rPr lang="en-US" smtClean="0"/>
-              <a:t>2/18/2022</a:t>
+              <a:t>1/29/2025</a:t>
             </a:fld>
             <a:endParaRPr lang="en-US"/>
           </a:p>
@@ -1712,7 +1711,7 @@
           <a:lstStyle/>
           <a:p>
             <a:r>
-              <a:rPr lang="en-US" smtClean="0"/>
+              <a:rPr lang="en-US"/>
               <a:t>Click to edit Master title style</a:t>
             </a:r>
             <a:endParaRPr lang="en-US" dirty="0"/>
@@ -1736,7 +1735,7 @@
           <a:p>
             <a:fld id="{DD486318-9DF8-4AB8-B4FE-404675D97C09}" type="datetimeFigureOut">
               <a:rPr lang="en-US" smtClean="0"/>
-              <a:t>2/18/2022</a:t>
+              <a:t>1/29/2025</a:t>
             </a:fld>
             <a:endParaRPr lang="en-US"/>
           </a:p>
@@ -1831,7 +1830,7 @@
           <a:p>
             <a:fld id="{DD486318-9DF8-4AB8-B4FE-404675D97C09}" type="datetimeFigureOut">
               <a:rPr lang="en-US" smtClean="0"/>
-              <a:t>2/18/2022</a:t>
+              <a:t>1/29/2025</a:t>
             </a:fld>
             <a:endParaRPr lang="en-US"/>
           </a:p>
@@ -1934,7 +1933,7 @@
           </a:lstStyle>
           <a:p>
             <a:r>
-              <a:rPr lang="en-US" smtClean="0"/>
+              <a:rPr lang="en-US"/>
               <a:t>Click to edit Master title style</a:t>
             </a:r>
             <a:endParaRPr lang="en-US" dirty="0"/>
@@ -1991,35 +1990,35 @@
           <a:p>
             <a:pPr lvl="0"/>
             <a:r>
-              <a:rPr lang="en-US" smtClean="0"/>
+              <a:rPr lang="en-US"/>
               <a:t>Edit Master text styles</a:t>
             </a:r>
           </a:p>
           <a:p>
             <a:pPr lvl="1"/>
             <a:r>
-              <a:rPr lang="en-US" smtClean="0"/>
+              <a:rPr lang="en-US"/>
               <a:t>Second level</a:t>
             </a:r>
           </a:p>
           <a:p>
             <a:pPr lvl="2"/>
             <a:r>
-              <a:rPr lang="en-US" smtClean="0"/>
+              <a:rPr lang="en-US"/>
               <a:t>Third level</a:t>
             </a:r>
           </a:p>
           <a:p>
             <a:pPr lvl="3"/>
             <a:r>
-              <a:rPr lang="en-US" smtClean="0"/>
+              <a:rPr lang="en-US"/>
               <a:t>Fourth level</a:t>
             </a:r>
           </a:p>
           <a:p>
             <a:pPr lvl="4"/>
             <a:r>
-              <a:rPr lang="en-US" smtClean="0"/>
+              <a:rPr lang="en-US"/>
               <a:t>Fifth level</a:t>
             </a:r>
             <a:endParaRPr lang="en-US" dirty="0"/>
@@ -2085,7 +2084,7 @@
           <a:p>
             <a:pPr lvl="0"/>
             <a:r>
-              <a:rPr lang="en-US" smtClean="0"/>
+              <a:rPr lang="en-US"/>
               <a:t>Edit Master text styles</a:t>
             </a:r>
           </a:p>
@@ -2108,7 +2107,7 @@
           <a:p>
             <a:fld id="{DD486318-9DF8-4AB8-B4FE-404675D97C09}" type="datetimeFigureOut">
               <a:rPr lang="en-US" smtClean="0"/>
-              <a:t>2/18/2022</a:t>
+              <a:t>1/29/2025</a:t>
             </a:fld>
             <a:endParaRPr lang="en-US"/>
           </a:p>
@@ -2211,7 +2210,7 @@
           </a:lstStyle>
           <a:p>
             <a:r>
-              <a:rPr lang="en-US" smtClean="0"/>
+              <a:rPr lang="en-US"/>
               <a:t>Click to edit Master title style</a:t>
             </a:r>
             <a:endParaRPr lang="en-US" dirty="0"/>
@@ -2276,7 +2275,7 @@
           </a:lstStyle>
           <a:p>
             <a:r>
-              <a:rPr lang="en-US" smtClean="0"/>
+              <a:rPr lang="en-US"/>
               <a:t>Click icon to add picture</a:t>
             </a:r>
             <a:endParaRPr lang="en-US" dirty="0"/>
@@ -2342,7 +2341,7 @@
           <a:p>
             <a:pPr lvl="0"/>
             <a:r>
-              <a:rPr lang="en-US" smtClean="0"/>
+              <a:rPr lang="en-US"/>
               <a:t>Edit Master text styles</a:t>
             </a:r>
           </a:p>
@@ -2365,7 +2364,7 @@
           <a:p>
             <a:fld id="{DD486318-9DF8-4AB8-B4FE-404675D97C09}" type="datetimeFigureOut">
               <a:rPr lang="en-US" smtClean="0"/>
-              <a:t>2/18/2022</a:t>
+              <a:t>1/29/2025</a:t>
             </a:fld>
             <a:endParaRPr lang="en-US"/>
           </a:p>
@@ -2474,7 +2473,7 @@
           <a:lstStyle/>
           <a:p>
             <a:r>
-              <a:rPr lang="en-US" smtClean="0"/>
+              <a:rPr lang="en-US"/>
               <a:t>Click to edit Master title style</a:t>
             </a:r>
             <a:endParaRPr lang="en-US" dirty="0"/>
@@ -2508,35 +2507,35 @@
           <a:p>
             <a:pPr lvl="0"/>
             <a:r>
-              <a:rPr lang="en-US" smtClean="0"/>
+              <a:rPr lang="en-US"/>
               <a:t>Edit Master text styles</a:t>
             </a:r>
           </a:p>
           <a:p>
             <a:pPr lvl="1"/>
             <a:r>
-              <a:rPr lang="en-US" smtClean="0"/>
+              <a:rPr lang="en-US"/>
               <a:t>Second level</a:t>
             </a:r>
           </a:p>
           <a:p>
             <a:pPr lvl="2"/>
             <a:r>
-              <a:rPr lang="en-US" smtClean="0"/>
+              <a:rPr lang="en-US"/>
               <a:t>Third level</a:t>
             </a:r>
           </a:p>
           <a:p>
             <a:pPr lvl="3"/>
             <a:r>
-              <a:rPr lang="en-US" smtClean="0"/>
+              <a:rPr lang="en-US"/>
               <a:t>Fourth level</a:t>
             </a:r>
           </a:p>
           <a:p>
             <a:pPr lvl="4"/>
             <a:r>
-              <a:rPr lang="en-US" smtClean="0"/>
+              <a:rPr lang="en-US"/>
               <a:t>Fifth level</a:t>
             </a:r>
             <a:endParaRPr lang="en-US" dirty="0"/>
@@ -2578,7 +2577,7 @@
           <a:p>
             <a:fld id="{DD486318-9DF8-4AB8-B4FE-404675D97C09}" type="datetimeFigureOut">
               <a:rPr lang="en-US" smtClean="0"/>
-              <a:t>2/18/2022</a:t>
+              <a:t>1/29/2025</a:t>
             </a:fld>
             <a:endParaRPr lang="en-US"/>
           </a:p>
@@ -2999,25 +2998,22 @@
           <a:lstStyle/>
           <a:p>
             <a:r>
-              <a:rPr lang="en-US" dirty="0" smtClean="0">
+              <a:rPr lang="en-US" dirty="0">
                 <a:latin typeface="Georgia" panose="02040502050405020303" pitchFamily="18" charset="0"/>
               </a:rPr>
               <a:t>Welcome to the</a:t>
             </a:r>
             <a:br>
-              <a:rPr lang="en-US" dirty="0" smtClean="0">
+              <a:rPr lang="en-US" dirty="0">
                 <a:latin typeface="Georgia" panose="02040502050405020303" pitchFamily="18" charset="0"/>
               </a:rPr>
             </a:br>
             <a:r>
-              <a:rPr lang="en-US" dirty="0" smtClean="0">
+              <a:rPr lang="en-US" dirty="0">
                 <a:latin typeface="Georgia" panose="02040502050405020303" pitchFamily="18" charset="0"/>
               </a:rPr>
               <a:t>Card Guessing Game!</a:t>
             </a:r>
-            <a:endParaRPr lang="en-US" dirty="0">
-              <a:latin typeface="Georgia" panose="02040502050405020303" pitchFamily="18" charset="0"/>
-            </a:endParaRPr>
           </a:p>
         </p:txBody>
       </p:sp>
@@ -3031,13 +3027,6 @@
   <p:clrMapOvr>
     <a:masterClrMapping/>
   </p:clrMapOvr>
-  <p:timing>
-    <p:tnLst>
-      <p:par>
-        <p:cTn id="1" dur="indefinite" restart="never" nodeType="tmRoot"/>
-      </p:par>
-    </p:tnLst>
-  </p:timing>
 </p:sld>
 </file>
 
@@ -3060,6 +3049,1359 @@
       </p:grpSpPr>
       <p:sp>
         <p:nvSpPr>
+          <p:cNvPr id="3" name="Content Placeholder 2"/>
+          <p:cNvSpPr>
+            <a:spLocks noGrp="1"/>
+          </p:cNvSpPr>
+          <p:nvPr>
+            <p:ph idx="1"/>
+          </p:nvPr>
+        </p:nvSpPr>
+        <p:spPr>
+          <a:xfrm>
+            <a:off x="838200" y="457983"/>
+            <a:ext cx="10515600" cy="5805029"/>
+          </a:xfrm>
+        </p:spPr>
+        <p:txBody>
+          <a:bodyPr>
+            <a:normAutofit fontScale="92500" lnSpcReduction="20000"/>
+          </a:bodyPr>
+          <a:lstStyle/>
+          <a:p>
+            <a:pPr marL="0" lvl="0" indent="0" eaLnBrk="0" fontAlgn="base" hangingPunct="0">
+              <a:lnSpc>
+                <a:spcPct val="100000"/>
+              </a:lnSpc>
+              <a:spcBef>
+                <a:spcPts val="1200"/>
+              </a:spcBef>
+              <a:spcAft>
+                <a:spcPct val="0"/>
+              </a:spcAft>
+              <a:buNone/>
+            </a:pPr>
+            <a:r>
+              <a:rPr lang="en-US" altLang="en-US" dirty="0">
+                <a:latin typeface="Georgia" panose="02040502050405020303" pitchFamily="18" charset="0"/>
+              </a:rPr>
+              <a:t>At the end of the task, we will </a:t>
+            </a:r>
+            <a:r>
+              <a:rPr lang="en-US" altLang="en-US" i="1" dirty="0">
+                <a:latin typeface="Georgia" panose="02040502050405020303" pitchFamily="18" charset="0"/>
+              </a:rPr>
+              <a:t>randomly choose ten trials </a:t>
+            </a:r>
+            <a:r>
+              <a:rPr lang="en-US" altLang="en-US" dirty="0">
+                <a:latin typeface="Georgia" panose="02040502050405020303" pitchFamily="18" charset="0"/>
+              </a:rPr>
+              <a:t>and will pay both you and your partner your total earnings for those trials.</a:t>
+            </a:r>
+          </a:p>
+          <a:p>
+            <a:pPr eaLnBrk="0" fontAlgn="base" hangingPunct="0">
+              <a:lnSpc>
+                <a:spcPct val="100000"/>
+              </a:lnSpc>
+              <a:spcBef>
+                <a:spcPts val="1200"/>
+              </a:spcBef>
+              <a:spcAft>
+                <a:spcPct val="0"/>
+              </a:spcAft>
+            </a:pPr>
+            <a:r>
+              <a:rPr lang="en-US" altLang="en-US" dirty="0">
+                <a:latin typeface="Georgia" panose="02040502050405020303" pitchFamily="18" charset="0"/>
+              </a:rPr>
+              <a:t>Any money earned with the computer will go back into a pool of general lab funds.</a:t>
+            </a:r>
+          </a:p>
+          <a:p>
+            <a:pPr eaLnBrk="0" fontAlgn="base" hangingPunct="0">
+              <a:lnSpc>
+                <a:spcPct val="100000"/>
+              </a:lnSpc>
+              <a:spcBef>
+                <a:spcPts val="1200"/>
+              </a:spcBef>
+              <a:spcAft>
+                <a:spcPct val="0"/>
+              </a:spcAft>
+            </a:pPr>
+            <a:r>
+              <a:rPr lang="en-US" altLang="en-US" dirty="0">
+                <a:latin typeface="Georgia" panose="02040502050405020303" pitchFamily="18" charset="0"/>
+              </a:rPr>
+              <a:t>There's no penalty for missing a trial, but if we happen to choose a missed trial as one of the random ten, you and your partner can't earn anything for that trial.</a:t>
+            </a:r>
+          </a:p>
+          <a:p>
+            <a:pPr marL="0" indent="0" eaLnBrk="0" fontAlgn="base" hangingPunct="0">
+              <a:lnSpc>
+                <a:spcPct val="100000"/>
+              </a:lnSpc>
+              <a:spcBef>
+                <a:spcPts val="1200"/>
+              </a:spcBef>
+              <a:spcAft>
+                <a:spcPct val="0"/>
+              </a:spcAft>
+              <a:buNone/>
+            </a:pPr>
+            <a:r>
+              <a:rPr lang="en-US" altLang="en-US" dirty="0">
+                <a:latin typeface="Georgia" panose="02040502050405020303" pitchFamily="18" charset="0"/>
+              </a:rPr>
+              <a:t>After your scan we’ll discuss the possibility of you being a study partner for future participants!</a:t>
+            </a:r>
+          </a:p>
+          <a:p>
+            <a:pPr marL="0" indent="0" eaLnBrk="0" fontAlgn="base" hangingPunct="0">
+              <a:lnSpc>
+                <a:spcPct val="100000"/>
+              </a:lnSpc>
+              <a:spcBef>
+                <a:spcPts val="1200"/>
+              </a:spcBef>
+              <a:spcAft>
+                <a:spcPct val="0"/>
+              </a:spcAft>
+              <a:buNone/>
+            </a:pPr>
+            <a:endParaRPr lang="en-US" altLang="en-US" dirty="0">
+              <a:latin typeface="Georgia" panose="02040502050405020303" pitchFamily="18" charset="0"/>
+            </a:endParaRPr>
+          </a:p>
+          <a:p>
+            <a:pPr marL="0" indent="0">
+              <a:buNone/>
+            </a:pPr>
+            <a:endParaRPr lang="en-US" altLang="en-US" dirty="0">
+              <a:latin typeface="Georgia" panose="02040502050405020303" pitchFamily="18" charset="0"/>
+            </a:endParaRPr>
+          </a:p>
+          <a:p>
+            <a:pPr marL="0" indent="0" algn="ctr">
+              <a:buNone/>
+            </a:pPr>
+            <a:r>
+              <a:rPr lang="en-US" altLang="en-US" dirty="0">
+                <a:latin typeface="Georgia" panose="02040502050405020303" pitchFamily="18" charset="0"/>
+              </a:rPr>
+              <a:t>Do you have any questions? We will go through some </a:t>
+            </a:r>
+            <a:r>
+              <a:rPr lang="en-US" altLang="en-US" i="1" dirty="0">
+                <a:latin typeface="Georgia" panose="02040502050405020303" pitchFamily="18" charset="0"/>
+              </a:rPr>
+              <a:t>practice trials </a:t>
+            </a:r>
+            <a:r>
+              <a:rPr lang="en-US" altLang="en-US" dirty="0">
+                <a:latin typeface="Georgia" panose="02040502050405020303" pitchFamily="18" charset="0"/>
+              </a:rPr>
+              <a:t>before you complete the actual experiment in the scanner so you can get used to the timing of the task. </a:t>
+            </a:r>
+            <a:r>
+              <a:rPr lang="en-US" altLang="en-US" b="1" dirty="0">
+                <a:latin typeface="Georgia" panose="02040502050405020303" pitchFamily="18" charset="0"/>
+              </a:rPr>
+              <a:t>Please let us know if anything about the game is unclear. </a:t>
+            </a:r>
+          </a:p>
+          <a:p>
+            <a:endParaRPr lang="en-US" dirty="0">
+              <a:latin typeface="Georgia" panose="02040502050405020303" pitchFamily="18" charset="0"/>
+            </a:endParaRPr>
+          </a:p>
+        </p:txBody>
+      </p:sp>
+    </p:spTree>
+    <p:extLst>
+      <p:ext uri="{BB962C8B-B14F-4D97-AF65-F5344CB8AC3E}">
+        <p14:creationId xmlns:p14="http://schemas.microsoft.com/office/powerpoint/2010/main" val="4208836316"/>
+      </p:ext>
+    </p:extLst>
+  </p:cSld>
+  <p:clrMapOvr>
+    <a:masterClrMapping/>
+  </p:clrMapOvr>
+</p:sld>
+</file>
+
+<file path=ppt/slides/slide2.xml><?xml version="1.0" encoding="utf-8"?>
+<p:sld xmlns:a="http://schemas.openxmlformats.org/drawingml/2006/main" xmlns:r="http://schemas.openxmlformats.org/officeDocument/2006/relationships" xmlns:p="http://schemas.openxmlformats.org/presentationml/2006/main">
+  <p:cSld>
+    <p:spTree>
+      <p:nvGrpSpPr>
+        <p:cNvPr id="1" name=""/>
+        <p:cNvGrpSpPr/>
+        <p:nvPr/>
+      </p:nvGrpSpPr>
+      <p:grpSpPr>
+        <a:xfrm>
+          <a:off x="0" y="0"/>
+          <a:ext cx="0" cy="0"/>
+          <a:chOff x="0" y="0"/>
+          <a:chExt cx="0" cy="0"/>
+        </a:xfrm>
+      </p:grpSpPr>
+      <p:sp>
+        <p:nvSpPr>
+          <p:cNvPr id="3" name="Content Placeholder 2"/>
+          <p:cNvSpPr>
+            <a:spLocks noGrp="1"/>
+          </p:cNvSpPr>
+          <p:nvPr>
+            <p:ph idx="1"/>
+          </p:nvPr>
+        </p:nvSpPr>
+        <p:spPr>
+          <a:xfrm>
+            <a:off x="974835" y="1436742"/>
+            <a:ext cx="10515600" cy="4794295"/>
+          </a:xfrm>
+        </p:spPr>
+        <p:txBody>
+          <a:bodyPr>
+            <a:normAutofit/>
+          </a:bodyPr>
+          <a:lstStyle/>
+          <a:p>
+            <a:pPr marL="0" indent="0" eaLnBrk="0" fontAlgn="base" hangingPunct="0">
+              <a:lnSpc>
+                <a:spcPct val="100000"/>
+              </a:lnSpc>
+              <a:spcBef>
+                <a:spcPct val="0"/>
+              </a:spcBef>
+              <a:spcAft>
+                <a:spcPts val="600"/>
+              </a:spcAft>
+              <a:buNone/>
+            </a:pPr>
+            <a:r>
+              <a:rPr lang="en-US" altLang="en-US" dirty="0">
+                <a:latin typeface="Georgia" panose="02040502050405020303" pitchFamily="18" charset="0"/>
+              </a:rPr>
+              <a:t>In this game, all you have to do on each trial of the task is </a:t>
+            </a:r>
+            <a:r>
+              <a:rPr lang="en-US" altLang="en-US" u="sng" dirty="0">
+                <a:latin typeface="Georgia" panose="02040502050405020303" pitchFamily="18" charset="0"/>
+              </a:rPr>
+              <a:t>guess whether the value of a card that appears on the screen is higher or lower than the number 5.</a:t>
+            </a:r>
+          </a:p>
+          <a:p>
+            <a:pPr marL="0" indent="0" eaLnBrk="0" fontAlgn="base" hangingPunct="0">
+              <a:lnSpc>
+                <a:spcPct val="100000"/>
+              </a:lnSpc>
+              <a:spcBef>
+                <a:spcPct val="0"/>
+              </a:spcBef>
+              <a:spcAft>
+                <a:spcPts val="600"/>
+              </a:spcAft>
+              <a:buNone/>
+            </a:pPr>
+            <a:endParaRPr lang="en-US" altLang="en-US" dirty="0">
+              <a:latin typeface="Georgia" panose="02040502050405020303" pitchFamily="18" charset="0"/>
+            </a:endParaRPr>
+          </a:p>
+          <a:p>
+            <a:pPr marL="0" indent="0" eaLnBrk="0" fontAlgn="base" hangingPunct="0">
+              <a:lnSpc>
+                <a:spcPct val="100000"/>
+              </a:lnSpc>
+              <a:spcBef>
+                <a:spcPct val="0"/>
+              </a:spcBef>
+              <a:spcAft>
+                <a:spcPts val="600"/>
+              </a:spcAft>
+              <a:buNone/>
+            </a:pPr>
+            <a:r>
+              <a:rPr lang="en-US" altLang="en-US" dirty="0">
+                <a:latin typeface="Georgia" panose="02040502050405020303" pitchFamily="18" charset="0"/>
+              </a:rPr>
+              <a:t>The number on the card can be between 1 and 10.</a:t>
+            </a:r>
+          </a:p>
+          <a:p>
+            <a:pPr eaLnBrk="0" fontAlgn="base" hangingPunct="0">
+              <a:lnSpc>
+                <a:spcPct val="100000"/>
+              </a:lnSpc>
+              <a:spcBef>
+                <a:spcPct val="0"/>
+              </a:spcBef>
+              <a:spcAft>
+                <a:spcPts val="600"/>
+              </a:spcAft>
+            </a:pPr>
+            <a:r>
+              <a:rPr lang="en-US" altLang="en-US" dirty="0">
+                <a:latin typeface="Georgia" panose="02040502050405020303" pitchFamily="18" charset="0"/>
+              </a:rPr>
+              <a:t>If you guess correctly, you will earn $10 for that trial.</a:t>
+            </a:r>
+          </a:p>
+          <a:p>
+            <a:pPr eaLnBrk="0" fontAlgn="base" hangingPunct="0">
+              <a:lnSpc>
+                <a:spcPct val="100000"/>
+              </a:lnSpc>
+              <a:spcBef>
+                <a:spcPct val="0"/>
+              </a:spcBef>
+              <a:spcAft>
+                <a:spcPts val="600"/>
+              </a:spcAft>
+            </a:pPr>
+            <a:r>
+              <a:rPr lang="en-US" altLang="en-US" dirty="0">
+                <a:latin typeface="Georgia" panose="02040502050405020303" pitchFamily="18" charset="0"/>
+              </a:rPr>
+              <a:t>If you guess incorrectly, you will lose $5 for that trial.</a:t>
+            </a:r>
+          </a:p>
+          <a:p>
+            <a:pPr eaLnBrk="0" fontAlgn="base" hangingPunct="0">
+              <a:lnSpc>
+                <a:spcPct val="100000"/>
+              </a:lnSpc>
+              <a:spcBef>
+                <a:spcPct val="0"/>
+              </a:spcBef>
+              <a:spcAft>
+                <a:spcPts val="600"/>
+              </a:spcAft>
+            </a:pPr>
+            <a:r>
+              <a:rPr lang="en-US" altLang="en-US" dirty="0">
+                <a:latin typeface="Georgia" panose="02040502050405020303" pitchFamily="18" charset="0"/>
+              </a:rPr>
+              <a:t>If the card number is exactly 5, nothing happens.</a:t>
+            </a:r>
+          </a:p>
+        </p:txBody>
+      </p:sp>
+    </p:spTree>
+    <p:extLst>
+      <p:ext uri="{BB962C8B-B14F-4D97-AF65-F5344CB8AC3E}">
+        <p14:creationId xmlns:p14="http://schemas.microsoft.com/office/powerpoint/2010/main" val="1160729909"/>
+      </p:ext>
+    </p:extLst>
+  </p:cSld>
+  <p:clrMapOvr>
+    <a:masterClrMapping/>
+  </p:clrMapOvr>
+</p:sld>
+</file>
+
+<file path=ppt/slides/slide3.xml><?xml version="1.0" encoding="utf-8"?>
+<p:sld xmlns:a="http://schemas.openxmlformats.org/drawingml/2006/main" xmlns:r="http://schemas.openxmlformats.org/officeDocument/2006/relationships" xmlns:p="http://schemas.openxmlformats.org/presentationml/2006/main">
+  <p:cSld>
+    <p:spTree>
+      <p:nvGrpSpPr>
+        <p:cNvPr id="1" name=""/>
+        <p:cNvGrpSpPr/>
+        <p:nvPr/>
+      </p:nvGrpSpPr>
+      <p:grpSpPr>
+        <a:xfrm>
+          <a:off x="0" y="0"/>
+          <a:ext cx="0" cy="0"/>
+          <a:chOff x="0" y="0"/>
+          <a:chExt cx="0" cy="0"/>
+        </a:xfrm>
+      </p:grpSpPr>
+      <p:sp>
+        <p:nvSpPr>
+          <p:cNvPr id="3" name="Content Placeholder 2"/>
+          <p:cNvSpPr>
+            <a:spLocks noGrp="1"/>
+          </p:cNvSpPr>
+          <p:nvPr>
+            <p:ph idx="1"/>
+          </p:nvPr>
+        </p:nvSpPr>
+        <p:spPr>
+          <a:xfrm>
+            <a:off x="838200" y="1594397"/>
+            <a:ext cx="10515600" cy="4351338"/>
+          </a:xfrm>
+        </p:spPr>
+        <p:txBody>
+          <a:bodyPr>
+            <a:normAutofit/>
+          </a:bodyPr>
+          <a:lstStyle/>
+          <a:p>
+            <a:pPr marL="0" lvl="0" indent="0" algn="ctr" eaLnBrk="0" fontAlgn="base" hangingPunct="0">
+              <a:lnSpc>
+                <a:spcPct val="100000"/>
+              </a:lnSpc>
+              <a:spcBef>
+                <a:spcPct val="0"/>
+              </a:spcBef>
+              <a:spcAft>
+                <a:spcPct val="0"/>
+              </a:spcAft>
+              <a:buNone/>
+            </a:pPr>
+            <a:r>
+              <a:rPr lang="en-US" altLang="en-US" dirty="0">
+                <a:latin typeface="Georgia" panose="02040502050405020303" pitchFamily="18" charset="0"/>
+              </a:rPr>
+              <a:t>Importantly, you will be playing with </a:t>
+            </a:r>
+            <a:r>
+              <a:rPr lang="en-US" altLang="en-US" b="1" dirty="0">
+                <a:latin typeface="Georgia" panose="02040502050405020303" pitchFamily="18" charset="0"/>
+              </a:rPr>
+              <a:t>2 partners today </a:t>
+            </a:r>
+            <a:r>
+              <a:rPr lang="en-US" altLang="en-US" dirty="0">
+                <a:latin typeface="Georgia" panose="02040502050405020303" pitchFamily="18" charset="0"/>
+              </a:rPr>
+              <a:t>and you will be </a:t>
+            </a:r>
+            <a:r>
+              <a:rPr lang="en-US" altLang="en-US" i="1" dirty="0">
+                <a:latin typeface="Georgia" panose="02040502050405020303" pitchFamily="18" charset="0"/>
+              </a:rPr>
+              <a:t>sharing</a:t>
+            </a:r>
+            <a:r>
+              <a:rPr lang="en-US" altLang="en-US" dirty="0">
+                <a:latin typeface="Georgia" panose="02040502050405020303" pitchFamily="18" charset="0"/>
+              </a:rPr>
+              <a:t> the monetary outcomes of the task with them.</a:t>
+            </a:r>
+          </a:p>
+          <a:p>
+            <a:pPr marL="0" lvl="0" indent="0" algn="ctr" eaLnBrk="0" fontAlgn="base" hangingPunct="0">
+              <a:lnSpc>
+                <a:spcPct val="100000"/>
+              </a:lnSpc>
+              <a:spcBef>
+                <a:spcPct val="0"/>
+              </a:spcBef>
+              <a:spcAft>
+                <a:spcPct val="0"/>
+              </a:spcAft>
+              <a:buNone/>
+            </a:pPr>
+            <a:endParaRPr lang="en-US" altLang="en-US" dirty="0">
+              <a:latin typeface="Georgia" panose="02040502050405020303" pitchFamily="18" charset="0"/>
+            </a:endParaRPr>
+          </a:p>
+          <a:p>
+            <a:pPr marL="0" lvl="0" indent="0" algn="ctr" eaLnBrk="0" fontAlgn="base" hangingPunct="0">
+              <a:lnSpc>
+                <a:spcPct val="100000"/>
+              </a:lnSpc>
+              <a:spcBef>
+                <a:spcPct val="0"/>
+              </a:spcBef>
+              <a:spcAft>
+                <a:spcPct val="0"/>
+              </a:spcAft>
+              <a:buNone/>
+            </a:pPr>
+            <a:r>
+              <a:rPr lang="en-US" altLang="en-US" dirty="0">
+                <a:latin typeface="Georgia" panose="02040502050405020303" pitchFamily="18" charset="0"/>
+              </a:rPr>
+              <a:t>Sometimes you will be playing with a </a:t>
+            </a:r>
+            <a:r>
+              <a:rPr lang="en-US" altLang="en-US" u="sng" dirty="0">
+                <a:latin typeface="Georgia" panose="02040502050405020303" pitchFamily="18" charset="0"/>
+              </a:rPr>
+              <a:t>computer</a:t>
+            </a:r>
+            <a:r>
+              <a:rPr lang="en-US" altLang="en-US" dirty="0">
+                <a:latin typeface="Georgia" panose="02040502050405020303" pitchFamily="18" charset="0"/>
+              </a:rPr>
+              <a:t>, and other times you will be playing with a </a:t>
+            </a:r>
+            <a:r>
+              <a:rPr lang="en-US" altLang="en-US" u="sng" dirty="0">
+                <a:latin typeface="Georgia" panose="02040502050405020303" pitchFamily="18" charset="0"/>
+              </a:rPr>
+              <a:t>stranger</a:t>
+            </a:r>
+            <a:r>
+              <a:rPr lang="en-US" altLang="en-US" dirty="0">
+                <a:latin typeface="Georgia" panose="02040502050405020303" pitchFamily="18" charset="0"/>
+              </a:rPr>
+              <a:t>.</a:t>
+            </a:r>
+          </a:p>
+          <a:p>
+            <a:pPr marL="0" lvl="0" indent="0" algn="ctr" eaLnBrk="0" fontAlgn="base" hangingPunct="0">
+              <a:lnSpc>
+                <a:spcPct val="100000"/>
+              </a:lnSpc>
+              <a:spcBef>
+                <a:spcPct val="0"/>
+              </a:spcBef>
+              <a:spcAft>
+                <a:spcPct val="0"/>
+              </a:spcAft>
+              <a:buNone/>
+            </a:pPr>
+            <a:endParaRPr lang="en-US" altLang="en-US" dirty="0">
+              <a:latin typeface="Georgia" panose="02040502050405020303" pitchFamily="18" charset="0"/>
+            </a:endParaRPr>
+          </a:p>
+          <a:p>
+            <a:pPr marL="0" lvl="0" indent="0" algn="ctr" eaLnBrk="0" fontAlgn="base" hangingPunct="0">
+              <a:lnSpc>
+                <a:spcPct val="100000"/>
+              </a:lnSpc>
+              <a:spcBef>
+                <a:spcPct val="0"/>
+              </a:spcBef>
+              <a:spcAft>
+                <a:spcPct val="0"/>
+              </a:spcAft>
+              <a:buNone/>
+            </a:pPr>
+            <a:r>
+              <a:rPr lang="en-US" altLang="en-US" dirty="0">
+                <a:latin typeface="Georgia" panose="02040502050405020303" pitchFamily="18" charset="0"/>
+              </a:rPr>
+              <a:t>This person is a real individual who has participated in our study recently, and who will receive payment based on your performance in the task, but whom you won’t get to meet.   </a:t>
+            </a:r>
+          </a:p>
+        </p:txBody>
+      </p:sp>
+    </p:spTree>
+    <p:extLst>
+      <p:ext uri="{BB962C8B-B14F-4D97-AF65-F5344CB8AC3E}">
+        <p14:creationId xmlns:p14="http://schemas.microsoft.com/office/powerpoint/2010/main" val="1520064628"/>
+      </p:ext>
+    </p:extLst>
+  </p:cSld>
+  <p:clrMapOvr>
+    <a:masterClrMapping/>
+  </p:clrMapOvr>
+</p:sld>
+</file>
+
+<file path=ppt/slides/slide4.xml><?xml version="1.0" encoding="utf-8"?>
+<p:sld xmlns:a="http://schemas.openxmlformats.org/drawingml/2006/main" xmlns:r="http://schemas.openxmlformats.org/officeDocument/2006/relationships" xmlns:p="http://schemas.openxmlformats.org/presentationml/2006/main">
+  <p:cSld>
+    <p:spTree>
+      <p:nvGrpSpPr>
+        <p:cNvPr id="1" name=""/>
+        <p:cNvGrpSpPr/>
+        <p:nvPr/>
+      </p:nvGrpSpPr>
+      <p:grpSpPr>
+        <a:xfrm>
+          <a:off x="0" y="0"/>
+          <a:ext cx="0" cy="0"/>
+          <a:chOff x="0" y="0"/>
+          <a:chExt cx="0" cy="0"/>
+        </a:xfrm>
+      </p:grpSpPr>
+      <p:sp>
+        <p:nvSpPr>
+          <p:cNvPr id="3" name="Content Placeholder 2"/>
+          <p:cNvSpPr>
+            <a:spLocks noGrp="1"/>
+          </p:cNvSpPr>
+          <p:nvPr>
+            <p:ph idx="1"/>
+          </p:nvPr>
+        </p:nvSpPr>
+        <p:spPr>
+          <a:xfrm>
+            <a:off x="869731" y="1426232"/>
+            <a:ext cx="10515600" cy="4351338"/>
+          </a:xfrm>
+        </p:spPr>
+        <p:txBody>
+          <a:bodyPr>
+            <a:normAutofit fontScale="92500" lnSpcReduction="20000"/>
+          </a:bodyPr>
+          <a:lstStyle/>
+          <a:p>
+            <a:pPr marL="0" lvl="0" indent="0" eaLnBrk="0" fontAlgn="base" hangingPunct="0">
+              <a:lnSpc>
+                <a:spcPct val="100000"/>
+              </a:lnSpc>
+              <a:spcBef>
+                <a:spcPct val="0"/>
+              </a:spcBef>
+              <a:spcAft>
+                <a:spcPts val="600"/>
+              </a:spcAft>
+              <a:buNone/>
+            </a:pPr>
+            <a:r>
+              <a:rPr lang="en-US" altLang="en-US" dirty="0">
+                <a:latin typeface="Georgia" panose="02040502050405020303" pitchFamily="18" charset="0"/>
+              </a:rPr>
+              <a:t>You will know which partner you are playing with on a given set of trials by the </a:t>
+            </a:r>
+            <a:r>
+              <a:rPr lang="en-US" altLang="en-US" u="sng" dirty="0">
+                <a:latin typeface="Georgia" panose="02040502050405020303" pitchFamily="18" charset="0"/>
+              </a:rPr>
+              <a:t>image that appears at the top of the screen </a:t>
+            </a:r>
+            <a:r>
+              <a:rPr lang="en-US" altLang="en-US" dirty="0">
+                <a:latin typeface="Georgia" panose="02040502050405020303" pitchFamily="18" charset="0"/>
+              </a:rPr>
+              <a:t>above the card.</a:t>
+            </a:r>
+          </a:p>
+          <a:p>
+            <a:pPr eaLnBrk="0" fontAlgn="base" hangingPunct="0">
+              <a:lnSpc>
+                <a:spcPct val="100000"/>
+              </a:lnSpc>
+              <a:spcBef>
+                <a:spcPct val="0"/>
+              </a:spcBef>
+              <a:spcAft>
+                <a:spcPts val="600"/>
+              </a:spcAft>
+            </a:pPr>
+            <a:r>
+              <a:rPr lang="en-US" altLang="en-US" dirty="0">
+                <a:latin typeface="Georgia" panose="02040502050405020303" pitchFamily="18" charset="0"/>
+              </a:rPr>
+              <a:t>The card will appear in the middle of the screen on each trial with a </a:t>
+            </a:r>
+            <a:r>
+              <a:rPr lang="en-US" altLang="en-US" b="1" dirty="0">
+                <a:latin typeface="Georgia" panose="02040502050405020303" pitchFamily="18" charset="0"/>
+              </a:rPr>
+              <a:t>question mark </a:t>
+            </a:r>
+            <a:r>
+              <a:rPr lang="en-US" altLang="en-US" dirty="0">
+                <a:latin typeface="Georgia" panose="02040502050405020303" pitchFamily="18" charset="0"/>
+              </a:rPr>
+              <a:t>inside.</a:t>
+            </a:r>
+          </a:p>
+          <a:p>
+            <a:pPr eaLnBrk="0" fontAlgn="base" hangingPunct="0">
+              <a:lnSpc>
+                <a:spcPct val="100000"/>
+              </a:lnSpc>
+              <a:spcBef>
+                <a:spcPct val="0"/>
+              </a:spcBef>
+              <a:spcAft>
+                <a:spcPts val="600"/>
+              </a:spcAft>
+            </a:pPr>
+            <a:r>
+              <a:rPr lang="en-US" altLang="en-US" dirty="0">
+                <a:latin typeface="Georgia" panose="02040502050405020303" pitchFamily="18" charset="0"/>
+              </a:rPr>
+              <a:t>The question mark will remain on the screen for approximately </a:t>
+            </a:r>
+            <a:r>
+              <a:rPr lang="en-US" altLang="en-US" b="1" dirty="0">
+                <a:latin typeface="Georgia" panose="02040502050405020303" pitchFamily="18" charset="0"/>
+              </a:rPr>
+              <a:t>2.5 seconds</a:t>
+            </a:r>
+            <a:r>
+              <a:rPr lang="en-US" altLang="en-US" dirty="0">
+                <a:latin typeface="Georgia" panose="02040502050405020303" pitchFamily="18" charset="0"/>
+              </a:rPr>
+              <a:t>, and during this time you have to enter your guess regarding the card value.</a:t>
+            </a:r>
+          </a:p>
+          <a:p>
+            <a:pPr eaLnBrk="0" fontAlgn="base" hangingPunct="0">
+              <a:lnSpc>
+                <a:spcPct val="100000"/>
+              </a:lnSpc>
+              <a:spcBef>
+                <a:spcPct val="0"/>
+              </a:spcBef>
+              <a:spcAft>
+                <a:spcPts val="600"/>
+              </a:spcAft>
+            </a:pPr>
+            <a:r>
+              <a:rPr lang="en-US" altLang="en-US" dirty="0">
+                <a:latin typeface="Georgia" panose="02040502050405020303" pitchFamily="18" charset="0"/>
+              </a:rPr>
+              <a:t>As long as you respond within 2.5s, speed is NOT critical here</a:t>
+            </a:r>
+          </a:p>
+          <a:p>
+            <a:pPr marL="0" lvl="0" indent="0" eaLnBrk="0" fontAlgn="base" hangingPunct="0">
+              <a:lnSpc>
+                <a:spcPct val="100000"/>
+              </a:lnSpc>
+              <a:spcBef>
+                <a:spcPct val="0"/>
+              </a:spcBef>
+              <a:spcAft>
+                <a:spcPct val="0"/>
+              </a:spcAft>
+              <a:buNone/>
+            </a:pPr>
+            <a:endParaRPr lang="en-US" altLang="en-US" dirty="0">
+              <a:latin typeface="Georgia" panose="02040502050405020303" pitchFamily="18" charset="0"/>
+            </a:endParaRPr>
+          </a:p>
+          <a:p>
+            <a:pPr marL="0" lvl="0" indent="0" eaLnBrk="0" fontAlgn="base" hangingPunct="0">
+              <a:lnSpc>
+                <a:spcPct val="100000"/>
+              </a:lnSpc>
+              <a:spcBef>
+                <a:spcPct val="0"/>
+              </a:spcBef>
+              <a:spcAft>
+                <a:spcPct val="0"/>
+              </a:spcAft>
+              <a:buNone/>
+            </a:pPr>
+            <a:r>
+              <a:rPr lang="en-US" altLang="en-US" dirty="0">
+                <a:latin typeface="Georgia" panose="02040502050405020303" pitchFamily="18" charset="0"/>
+              </a:rPr>
+              <a:t>Press with your </a:t>
+            </a:r>
+            <a:r>
+              <a:rPr lang="en-US" altLang="en-US" i="1" dirty="0">
+                <a:solidFill>
+                  <a:srgbClr val="00B050"/>
+                </a:solidFill>
+                <a:latin typeface="Georgia" panose="02040502050405020303" pitchFamily="18" charset="0"/>
+              </a:rPr>
+              <a:t>index</a:t>
+            </a:r>
+            <a:r>
+              <a:rPr lang="en-US" altLang="en-US" i="1" dirty="0">
+                <a:latin typeface="Georgia" panose="02040502050405020303" pitchFamily="18" charset="0"/>
+              </a:rPr>
+              <a:t> finger </a:t>
+            </a:r>
+            <a:r>
+              <a:rPr lang="en-US" altLang="en-US" dirty="0">
+                <a:latin typeface="Georgia" panose="02040502050405020303" pitchFamily="18" charset="0"/>
+              </a:rPr>
+              <a:t>if you think the card will be </a:t>
+            </a:r>
+            <a:r>
+              <a:rPr lang="en-US" altLang="en-US" dirty="0">
+                <a:solidFill>
+                  <a:srgbClr val="00B050"/>
+                </a:solidFill>
+                <a:latin typeface="Georgia" panose="02040502050405020303" pitchFamily="18" charset="0"/>
+              </a:rPr>
+              <a:t>higher</a:t>
+            </a:r>
+            <a:r>
+              <a:rPr lang="en-US" altLang="en-US" dirty="0">
+                <a:latin typeface="Georgia" panose="02040502050405020303" pitchFamily="18" charset="0"/>
+              </a:rPr>
+              <a:t> than 5, and press with your </a:t>
+            </a:r>
+            <a:r>
+              <a:rPr lang="en-US" altLang="en-US" i="1" dirty="0">
+                <a:solidFill>
+                  <a:srgbClr val="00B0F0"/>
+                </a:solidFill>
+                <a:latin typeface="Georgia" panose="02040502050405020303" pitchFamily="18" charset="0"/>
+              </a:rPr>
+              <a:t>middle</a:t>
+            </a:r>
+            <a:r>
+              <a:rPr lang="en-US" altLang="en-US" i="1" dirty="0">
+                <a:latin typeface="Georgia" panose="02040502050405020303" pitchFamily="18" charset="0"/>
+              </a:rPr>
+              <a:t> finger</a:t>
+            </a:r>
+            <a:r>
+              <a:rPr lang="en-US" altLang="en-US" dirty="0">
+                <a:latin typeface="Georgia" panose="02040502050405020303" pitchFamily="18" charset="0"/>
+              </a:rPr>
+              <a:t> if you think the card will be </a:t>
+            </a:r>
+            <a:r>
+              <a:rPr lang="en-US" altLang="en-US" dirty="0">
+                <a:solidFill>
+                  <a:srgbClr val="00B0F0"/>
+                </a:solidFill>
+                <a:latin typeface="Georgia" panose="02040502050405020303" pitchFamily="18" charset="0"/>
+              </a:rPr>
+              <a:t>lower</a:t>
+            </a:r>
+            <a:r>
+              <a:rPr lang="en-US" altLang="en-US" dirty="0">
+                <a:latin typeface="Georgia" panose="02040502050405020303" pitchFamily="18" charset="0"/>
+              </a:rPr>
+              <a:t> than 5.</a:t>
+            </a:r>
+          </a:p>
+        </p:txBody>
+      </p:sp>
+    </p:spTree>
+    <p:extLst>
+      <p:ext uri="{BB962C8B-B14F-4D97-AF65-F5344CB8AC3E}">
+        <p14:creationId xmlns:p14="http://schemas.microsoft.com/office/powerpoint/2010/main" val="1792649367"/>
+      </p:ext>
+    </p:extLst>
+  </p:cSld>
+  <p:clrMapOvr>
+    <a:masterClrMapping/>
+  </p:clrMapOvr>
+</p:sld>
+</file>
+
+<file path=ppt/slides/slide5.xml><?xml version="1.0" encoding="utf-8"?>
+<p:sld xmlns:a="http://schemas.openxmlformats.org/drawingml/2006/main" xmlns:r="http://schemas.openxmlformats.org/officeDocument/2006/relationships" xmlns:p="http://schemas.openxmlformats.org/presentationml/2006/main">
+  <p:cSld>
+    <p:spTree>
+      <p:nvGrpSpPr>
+        <p:cNvPr id="1" name=""/>
+        <p:cNvGrpSpPr/>
+        <p:nvPr/>
+      </p:nvGrpSpPr>
+      <p:grpSpPr>
+        <a:xfrm>
+          <a:off x="0" y="0"/>
+          <a:ext cx="0" cy="0"/>
+          <a:chOff x="0" y="0"/>
+          <a:chExt cx="0" cy="0"/>
+        </a:xfrm>
+      </p:grpSpPr>
+      <p:pic>
+        <p:nvPicPr>
+          <p:cNvPr id="4" name="Content Placeholder 3"/>
+          <p:cNvPicPr>
+            <a:picLocks noGrp="1" noChangeAspect="1"/>
+          </p:cNvPicPr>
+          <p:nvPr>
+            <p:ph idx="1"/>
+          </p:nvPr>
+        </p:nvPicPr>
+        <p:blipFill>
+          <a:blip r:embed="rId2" cstate="print">
+            <a:extLst>
+              <a:ext uri="{28A0092B-C50C-407E-A947-70E740481C1C}">
+                <a14:useLocalDpi xmlns:a14="http://schemas.microsoft.com/office/drawing/2010/main" val="0"/>
+              </a:ext>
+            </a:extLst>
+          </a:blip>
+          <a:stretch>
+            <a:fillRect/>
+          </a:stretch>
+        </p:blipFill>
+        <p:spPr>
+          <a:xfrm>
+            <a:off x="4765102" y="522342"/>
+            <a:ext cx="2661795" cy="4351338"/>
+          </a:xfrm>
+        </p:spPr>
+      </p:pic>
+      <p:sp>
+        <p:nvSpPr>
+          <p:cNvPr id="5" name="Rectangle 4"/>
+          <p:cNvSpPr/>
+          <p:nvPr/>
+        </p:nvSpPr>
+        <p:spPr>
+          <a:xfrm>
+            <a:off x="3047999" y="5030897"/>
+            <a:ext cx="6096000" cy="1200329"/>
+          </a:xfrm>
+          <a:prstGeom prst="rect">
+            <a:avLst/>
+          </a:prstGeom>
+        </p:spPr>
+        <p:txBody>
+          <a:bodyPr>
+            <a:spAutoFit/>
+          </a:bodyPr>
+          <a:lstStyle/>
+          <a:p>
+            <a:pPr algn="ctr"/>
+            <a:r>
+              <a:rPr lang="en-US" dirty="0">
+                <a:latin typeface="Georgia" panose="02040502050405020303" pitchFamily="18" charset="0"/>
+              </a:rPr>
+              <a:t>The image above the card will either be of a computer, or the </a:t>
+            </a:r>
+            <a:r>
+              <a:rPr lang="en-US">
+                <a:latin typeface="Georgia" panose="02040502050405020303" pitchFamily="18" charset="0"/>
+              </a:rPr>
+              <a:t>recent participant whose </a:t>
+            </a:r>
+            <a:r>
+              <a:rPr lang="en-US" dirty="0">
+                <a:latin typeface="Georgia" panose="02040502050405020303" pitchFamily="18" charset="0"/>
+              </a:rPr>
+              <a:t>reward depends on your performance. When you make a guess, the question mark on the screen will turn orange, as pictured.</a:t>
+            </a:r>
+          </a:p>
+        </p:txBody>
+      </p:sp>
+    </p:spTree>
+    <p:extLst>
+      <p:ext uri="{BB962C8B-B14F-4D97-AF65-F5344CB8AC3E}">
+        <p14:creationId xmlns:p14="http://schemas.microsoft.com/office/powerpoint/2010/main" val="3531808893"/>
+      </p:ext>
+    </p:extLst>
+  </p:cSld>
+  <p:clrMapOvr>
+    <a:masterClrMapping/>
+  </p:clrMapOvr>
+</p:sld>
+</file>
+
+<file path=ppt/slides/slide6.xml><?xml version="1.0" encoding="utf-8"?>
+<p:sld xmlns:a="http://schemas.openxmlformats.org/drawingml/2006/main" xmlns:r="http://schemas.openxmlformats.org/officeDocument/2006/relationships" xmlns:p="http://schemas.openxmlformats.org/presentationml/2006/main">
+  <p:cSld>
+    <p:spTree>
+      <p:nvGrpSpPr>
+        <p:cNvPr id="1" name=""/>
+        <p:cNvGrpSpPr/>
+        <p:nvPr/>
+      </p:nvGrpSpPr>
+      <p:grpSpPr>
+        <a:xfrm>
+          <a:off x="0" y="0"/>
+          <a:ext cx="0" cy="0"/>
+          <a:chOff x="0" y="0"/>
+          <a:chExt cx="0" cy="0"/>
+        </a:xfrm>
+      </p:grpSpPr>
+      <p:sp>
+        <p:nvSpPr>
+          <p:cNvPr id="3" name="Content Placeholder 2"/>
+          <p:cNvSpPr>
+            <a:spLocks noGrp="1"/>
+          </p:cNvSpPr>
+          <p:nvPr>
+            <p:ph idx="1"/>
+          </p:nvPr>
+        </p:nvSpPr>
+        <p:spPr>
+          <a:xfrm>
+            <a:off x="901262" y="1468272"/>
+            <a:ext cx="10515600" cy="4351338"/>
+          </a:xfrm>
+        </p:spPr>
+        <p:txBody>
+          <a:bodyPr>
+            <a:normAutofit fontScale="70000" lnSpcReduction="20000"/>
+          </a:bodyPr>
+          <a:lstStyle/>
+          <a:p>
+            <a:pPr marL="0" lvl="0" indent="0" eaLnBrk="0" fontAlgn="base" hangingPunct="0">
+              <a:lnSpc>
+                <a:spcPct val="100000"/>
+              </a:lnSpc>
+              <a:spcBef>
+                <a:spcPts val="1200"/>
+              </a:spcBef>
+              <a:spcAft>
+                <a:spcPct val="0"/>
+              </a:spcAft>
+              <a:buNone/>
+            </a:pPr>
+            <a:r>
+              <a:rPr lang="en-US" altLang="en-US" b="1" dirty="0">
+                <a:latin typeface="Georgia" panose="02040502050405020303" pitchFamily="18" charset="0"/>
+              </a:rPr>
+              <a:t>Every monetary outcome on each trial of the task will be shared equally between you and your partner on the screen</a:t>
+            </a:r>
+            <a:r>
+              <a:rPr lang="en-US" altLang="en-US" dirty="0">
+                <a:latin typeface="Georgia" panose="02040502050405020303" pitchFamily="18" charset="0"/>
+              </a:rPr>
+              <a:t>.</a:t>
+            </a:r>
+          </a:p>
+          <a:p>
+            <a:pPr eaLnBrk="0" fontAlgn="base" hangingPunct="0">
+              <a:lnSpc>
+                <a:spcPct val="100000"/>
+              </a:lnSpc>
+              <a:spcBef>
+                <a:spcPts val="1200"/>
+              </a:spcBef>
+              <a:spcAft>
+                <a:spcPct val="0"/>
+              </a:spcAft>
+            </a:pPr>
+            <a:r>
+              <a:rPr lang="en-US" altLang="en-US" dirty="0">
+                <a:latin typeface="Georgia" panose="02040502050405020303" pitchFamily="18" charset="0"/>
+              </a:rPr>
+              <a:t>Earning $10 for guessing correctly means that you earn $5 for yourself and $5 for your partner.</a:t>
+            </a:r>
+          </a:p>
+          <a:p>
+            <a:pPr eaLnBrk="0" fontAlgn="base" hangingPunct="0">
+              <a:lnSpc>
+                <a:spcPct val="100000"/>
+              </a:lnSpc>
+              <a:spcBef>
+                <a:spcPts val="1200"/>
+              </a:spcBef>
+              <a:spcAft>
+                <a:spcPct val="0"/>
+              </a:spcAft>
+            </a:pPr>
+            <a:r>
+              <a:rPr lang="en-US" altLang="en-US" dirty="0">
+                <a:latin typeface="Georgia" panose="02040502050405020303" pitchFamily="18" charset="0"/>
+              </a:rPr>
+              <a:t>Losing $5 for an incorrect guess means that both you and your partner will each lose $2.50.</a:t>
+            </a:r>
+          </a:p>
+          <a:p>
+            <a:pPr eaLnBrk="0" fontAlgn="base" hangingPunct="0">
+              <a:lnSpc>
+                <a:spcPct val="100000"/>
+              </a:lnSpc>
+              <a:spcBef>
+                <a:spcPts val="1200"/>
+              </a:spcBef>
+              <a:spcAft>
+                <a:spcPct val="0"/>
+              </a:spcAft>
+            </a:pPr>
+            <a:endParaRPr lang="en-US" altLang="en-US" dirty="0">
+              <a:latin typeface="Georgia" panose="02040502050405020303" pitchFamily="18" charset="0"/>
+            </a:endParaRPr>
+          </a:p>
+          <a:p>
+            <a:pPr marL="0" indent="0" eaLnBrk="0" fontAlgn="base" hangingPunct="0">
+              <a:lnSpc>
+                <a:spcPct val="100000"/>
+              </a:lnSpc>
+              <a:spcBef>
+                <a:spcPts val="1200"/>
+              </a:spcBef>
+              <a:spcAft>
+                <a:spcPct val="0"/>
+              </a:spcAft>
+              <a:buNone/>
+            </a:pPr>
+            <a:r>
+              <a:rPr lang="en-US" b="1" dirty="0">
+                <a:latin typeface="Georgia" panose="02040502050405020303" pitchFamily="18" charset="0"/>
+                <a:cs typeface="Arial" panose="020B0604020202020204" pitchFamily="34" charset="0"/>
+              </a:rPr>
+              <a:t>After you indicate your choice, you will see the actual value of the card.</a:t>
+            </a:r>
+          </a:p>
+          <a:p>
+            <a:pPr eaLnBrk="0" fontAlgn="base" hangingPunct="0">
+              <a:spcBef>
+                <a:spcPts val="1200"/>
+              </a:spcBef>
+              <a:spcAft>
+                <a:spcPct val="0"/>
+              </a:spcAft>
+            </a:pPr>
+            <a:r>
+              <a:rPr lang="en-US" dirty="0">
+                <a:latin typeface="Georgia" panose="02040502050405020303" pitchFamily="18" charset="0"/>
+                <a:cs typeface="Arial" panose="020B0604020202020204" pitchFamily="34" charset="0"/>
+              </a:rPr>
+              <a:t>If your guess was correct, you'll see a green arrow pointing up, indicating monetary gain.</a:t>
+            </a:r>
+          </a:p>
+          <a:p>
+            <a:pPr eaLnBrk="0" fontAlgn="base" hangingPunct="0">
+              <a:spcBef>
+                <a:spcPts val="1200"/>
+              </a:spcBef>
+              <a:spcAft>
+                <a:spcPct val="0"/>
+              </a:spcAft>
+            </a:pPr>
+            <a:r>
+              <a:rPr lang="en-US" dirty="0">
+                <a:latin typeface="Georgia" panose="02040502050405020303" pitchFamily="18" charset="0"/>
+                <a:cs typeface="Arial" panose="020B0604020202020204" pitchFamily="34" charset="0"/>
+              </a:rPr>
+              <a:t>If it was incorrect, you'll see a red arrow pointing down indicating a loss.</a:t>
+            </a:r>
+          </a:p>
+          <a:p>
+            <a:pPr eaLnBrk="0" fontAlgn="base" hangingPunct="0">
+              <a:spcBef>
+                <a:spcPts val="1200"/>
+              </a:spcBef>
+              <a:spcAft>
+                <a:spcPct val="0"/>
+              </a:spcAft>
+            </a:pPr>
+            <a:r>
+              <a:rPr lang="en-US" dirty="0">
+                <a:latin typeface="Georgia" panose="02040502050405020303" pitchFamily="18" charset="0"/>
+                <a:cs typeface="Arial" panose="020B0604020202020204" pitchFamily="34" charset="0"/>
+              </a:rPr>
+              <a:t>If you happen to not respond within the 2.5 seconds, you won't see anything but the value of the card, and a # sign will show on the screen.</a:t>
+            </a:r>
+            <a:endParaRPr lang="en-US" altLang="en-US" dirty="0">
+              <a:latin typeface="Georgia" panose="02040502050405020303" pitchFamily="18" charset="0"/>
+              <a:cs typeface="Arial" panose="020B0604020202020204" pitchFamily="34" charset="0"/>
+            </a:endParaRPr>
+          </a:p>
+          <a:p>
+            <a:pPr marL="0" lvl="0" indent="0" eaLnBrk="0" fontAlgn="base" hangingPunct="0">
+              <a:lnSpc>
+                <a:spcPct val="100000"/>
+              </a:lnSpc>
+              <a:spcBef>
+                <a:spcPct val="0"/>
+              </a:spcBef>
+              <a:spcAft>
+                <a:spcPct val="0"/>
+              </a:spcAft>
+              <a:buNone/>
+            </a:pPr>
+            <a:endParaRPr lang="en-US" altLang="en-US" dirty="0">
+              <a:latin typeface="Georgia" panose="02040502050405020303" pitchFamily="18" charset="0"/>
+            </a:endParaRPr>
+          </a:p>
+        </p:txBody>
+      </p:sp>
+    </p:spTree>
+    <p:extLst>
+      <p:ext uri="{BB962C8B-B14F-4D97-AF65-F5344CB8AC3E}">
+        <p14:creationId xmlns:p14="http://schemas.microsoft.com/office/powerpoint/2010/main" val="1138182282"/>
+      </p:ext>
+    </p:extLst>
+  </p:cSld>
+  <p:clrMapOvr>
+    <a:masterClrMapping/>
+  </p:clrMapOvr>
+</p:sld>
+</file>
+
+<file path=ppt/slides/slide7.xml><?xml version="1.0" encoding="utf-8"?>
+<p:sld xmlns:a="http://schemas.openxmlformats.org/drawingml/2006/main" xmlns:r="http://schemas.openxmlformats.org/officeDocument/2006/relationships" xmlns:p="http://schemas.openxmlformats.org/presentationml/2006/main">
+  <p:cSld>
+    <p:spTree>
+      <p:nvGrpSpPr>
+        <p:cNvPr id="1" name=""/>
+        <p:cNvGrpSpPr/>
+        <p:nvPr/>
+      </p:nvGrpSpPr>
+      <p:grpSpPr>
+        <a:xfrm>
+          <a:off x="0" y="0"/>
+          <a:ext cx="0" cy="0"/>
+          <a:chOff x="0" y="0"/>
+          <a:chExt cx="0" cy="0"/>
+        </a:xfrm>
+      </p:grpSpPr>
+      <p:pic>
+        <p:nvPicPr>
+          <p:cNvPr id="4" name="Content Placeholder 3"/>
+          <p:cNvPicPr>
+            <a:picLocks noGrp="1" noChangeAspect="1"/>
+          </p:cNvPicPr>
+          <p:nvPr>
+            <p:ph idx="1"/>
+          </p:nvPr>
+        </p:nvPicPr>
+        <p:blipFill>
+          <a:blip r:embed="rId2" cstate="print">
+            <a:extLst>
+              <a:ext uri="{28A0092B-C50C-407E-A947-70E740481C1C}">
+                <a14:useLocalDpi xmlns:a14="http://schemas.microsoft.com/office/drawing/2010/main" val="0"/>
+              </a:ext>
+            </a:extLst>
+          </a:blip>
+          <a:stretch>
+            <a:fillRect/>
+          </a:stretch>
+        </p:blipFill>
+        <p:spPr>
+          <a:xfrm>
+            <a:off x="4261979" y="754067"/>
+            <a:ext cx="3668041" cy="4351338"/>
+          </a:xfrm>
+        </p:spPr>
+      </p:pic>
+      <p:sp>
+        <p:nvSpPr>
+          <p:cNvPr id="5" name="Rectangle 4"/>
+          <p:cNvSpPr/>
+          <p:nvPr/>
+        </p:nvSpPr>
+        <p:spPr>
+          <a:xfrm>
+            <a:off x="2772736" y="5354159"/>
+            <a:ext cx="6646525" cy="1200329"/>
+          </a:xfrm>
+          <a:prstGeom prst="rect">
+            <a:avLst/>
+          </a:prstGeom>
+        </p:spPr>
+        <p:txBody>
+          <a:bodyPr wrap="square">
+            <a:spAutoFit/>
+          </a:bodyPr>
+          <a:lstStyle/>
+          <a:p>
+            <a:pPr algn="ctr"/>
+            <a:r>
+              <a:rPr lang="en-US" dirty="0">
+                <a:latin typeface="Georgia" panose="02040502050405020303" pitchFamily="18" charset="0"/>
+              </a:rPr>
+              <a:t>For example, imagine you guessed ‘lower than 5’ and the card was an ‘8.’ In this case, a red down arrow would appear, meaning an incorrect guess and monetary loss of $2.50 each for you and whichever partner was on the screen.</a:t>
+            </a:r>
+          </a:p>
+        </p:txBody>
+      </p:sp>
+    </p:spTree>
+    <p:extLst>
+      <p:ext uri="{BB962C8B-B14F-4D97-AF65-F5344CB8AC3E}">
+        <p14:creationId xmlns:p14="http://schemas.microsoft.com/office/powerpoint/2010/main" val="713733602"/>
+      </p:ext>
+    </p:extLst>
+  </p:cSld>
+  <p:clrMapOvr>
+    <a:masterClrMapping/>
+  </p:clrMapOvr>
+</p:sld>
+</file>
+
+<file path=ppt/slides/slide8.xml><?xml version="1.0" encoding="utf-8"?>
+<p:sld xmlns:a="http://schemas.openxmlformats.org/drawingml/2006/main" xmlns:r="http://schemas.openxmlformats.org/officeDocument/2006/relationships" xmlns:p="http://schemas.openxmlformats.org/presentationml/2006/main">
+  <p:cSld>
+    <p:spTree>
+      <p:nvGrpSpPr>
+        <p:cNvPr id="1" name=""/>
+        <p:cNvGrpSpPr/>
+        <p:nvPr/>
+      </p:nvGrpSpPr>
+      <p:grpSpPr>
+        <a:xfrm>
+          <a:off x="0" y="0"/>
+          <a:ext cx="0" cy="0"/>
+          <a:chOff x="0" y="0"/>
+          <a:chExt cx="0" cy="0"/>
+        </a:xfrm>
+      </p:grpSpPr>
+      <p:pic>
+        <p:nvPicPr>
+          <p:cNvPr id="4" name="Content Placeholder 3"/>
+          <p:cNvPicPr>
+            <a:picLocks noGrp="1" noChangeAspect="1"/>
+          </p:cNvPicPr>
+          <p:nvPr>
+            <p:ph idx="1"/>
+          </p:nvPr>
+        </p:nvPicPr>
+        <p:blipFill>
+          <a:blip r:embed="rId2" cstate="print">
+            <a:extLst>
+              <a:ext uri="{28A0092B-C50C-407E-A947-70E740481C1C}">
+                <a14:useLocalDpi xmlns:a14="http://schemas.microsoft.com/office/drawing/2010/main" val="0"/>
+              </a:ext>
+            </a:extLst>
+          </a:blip>
+          <a:stretch>
+            <a:fillRect/>
+          </a:stretch>
+        </p:blipFill>
+        <p:spPr>
+          <a:xfrm>
+            <a:off x="4192290" y="791666"/>
+            <a:ext cx="3807420" cy="4351338"/>
+          </a:xfrm>
+        </p:spPr>
+      </p:pic>
+      <p:sp>
+        <p:nvSpPr>
+          <p:cNvPr id="5" name="Rectangle 4"/>
+          <p:cNvSpPr/>
+          <p:nvPr/>
+        </p:nvSpPr>
+        <p:spPr>
+          <a:xfrm>
+            <a:off x="3048000" y="5347742"/>
+            <a:ext cx="6096000" cy="1200329"/>
+          </a:xfrm>
+          <a:prstGeom prst="rect">
+            <a:avLst/>
+          </a:prstGeom>
+        </p:spPr>
+        <p:txBody>
+          <a:bodyPr>
+            <a:spAutoFit/>
+          </a:bodyPr>
+          <a:lstStyle/>
+          <a:p>
+            <a:pPr algn="ctr"/>
+            <a:r>
+              <a:rPr lang="en-US" dirty="0">
+                <a:latin typeface="Georgia" panose="02040502050405020303" pitchFamily="18" charset="0"/>
+              </a:rPr>
+              <a:t>If the card had been a ‘4,’ then a guess of ‘lower than 5’ would have been correct. In this case you would see a green arrow pointing up, meaning a monetary gain of $5 each for both you and the partner on the screen</a:t>
+            </a:r>
+          </a:p>
+        </p:txBody>
+      </p:sp>
+    </p:spTree>
+    <p:extLst>
+      <p:ext uri="{BB962C8B-B14F-4D97-AF65-F5344CB8AC3E}">
+        <p14:creationId xmlns:p14="http://schemas.microsoft.com/office/powerpoint/2010/main" val="2264260381"/>
+      </p:ext>
+    </p:extLst>
+  </p:cSld>
+  <p:clrMapOvr>
+    <a:masterClrMapping/>
+  </p:clrMapOvr>
+</p:sld>
+</file>
+
+<file path=ppt/slides/slide9.xml><?xml version="1.0" encoding="utf-8"?>
+<p:sld xmlns:a="http://schemas.openxmlformats.org/drawingml/2006/main" xmlns:r="http://schemas.openxmlformats.org/officeDocument/2006/relationships" xmlns:p="http://schemas.openxmlformats.org/presentationml/2006/main">
+  <p:cSld>
+    <p:spTree>
+      <p:nvGrpSpPr>
+        <p:cNvPr id="1" name=""/>
+        <p:cNvGrpSpPr/>
+        <p:nvPr/>
+      </p:nvGrpSpPr>
+      <p:grpSpPr>
+        <a:xfrm>
+          <a:off x="0" y="0"/>
+          <a:ext cx="0" cy="0"/>
+          <a:chOff x="0" y="0"/>
+          <a:chExt cx="0" cy="0"/>
+        </a:xfrm>
+      </p:grpSpPr>
+      <p:sp>
+        <p:nvSpPr>
           <p:cNvPr id="4" name="Rectangle 3"/>
           <p:cNvSpPr/>
           <p:nvPr/>
@@ -3081,14 +4423,11 @@
           <a:p>
             <a:pPr algn="ctr"/>
             <a:r>
-              <a:rPr lang="en-US" dirty="0" smtClean="0">
+              <a:rPr lang="en-US" dirty="0">
                 <a:latin typeface="Georgia" panose="02040502050405020303" pitchFamily="18" charset="0"/>
               </a:rPr>
               <a:t>If you don’t respond in time, you will see the above symbol</a:t>
             </a:r>
-            <a:endParaRPr lang="en-US" dirty="0">
-              <a:latin typeface="Georgia" panose="02040502050405020303" pitchFamily="18" charset="0"/>
-            </a:endParaRPr>
           </a:p>
         </p:txBody>
       </p:sp>
@@ -3132,1718 +4471,6 @@
   <p:clrMapOvr>
     <a:masterClrMapping/>
   </p:clrMapOvr>
-  <p:timing>
-    <p:tnLst>
-      <p:par>
-        <p:cTn id="1" dur="indefinite" restart="never" nodeType="tmRoot"/>
-      </p:par>
-    </p:tnLst>
-  </p:timing>
-</p:sld>
-</file>
-
-<file path=ppt/slides/slide11.xml><?xml version="1.0" encoding="utf-8"?>
-<p:sld xmlns:a="http://schemas.openxmlformats.org/drawingml/2006/main" xmlns:r="http://schemas.openxmlformats.org/officeDocument/2006/relationships" xmlns:p="http://schemas.openxmlformats.org/presentationml/2006/main">
-  <p:cSld>
-    <p:spTree>
-      <p:nvGrpSpPr>
-        <p:cNvPr id="1" name=""/>
-        <p:cNvGrpSpPr/>
-        <p:nvPr/>
-      </p:nvGrpSpPr>
-      <p:grpSpPr>
-        <a:xfrm>
-          <a:off x="0" y="0"/>
-          <a:ext cx="0" cy="0"/>
-          <a:chOff x="0" y="0"/>
-          <a:chExt cx="0" cy="0"/>
-        </a:xfrm>
-      </p:grpSpPr>
-      <p:sp>
-        <p:nvSpPr>
-          <p:cNvPr id="3" name="Content Placeholder 2"/>
-          <p:cNvSpPr>
-            <a:spLocks noGrp="1"/>
-          </p:cNvSpPr>
-          <p:nvPr>
-            <p:ph idx="1"/>
-          </p:nvPr>
-        </p:nvSpPr>
-        <p:spPr>
-          <a:xfrm>
-            <a:off x="838200" y="457983"/>
-            <a:ext cx="10515600" cy="5805029"/>
-          </a:xfrm>
-        </p:spPr>
-        <p:txBody>
-          <a:bodyPr>
-            <a:normAutofit fontScale="92500" lnSpcReduction="20000"/>
-          </a:bodyPr>
-          <a:lstStyle/>
-          <a:p>
-            <a:pPr marL="0" lvl="0" indent="0" eaLnBrk="0" fontAlgn="base" hangingPunct="0">
-              <a:lnSpc>
-                <a:spcPct val="100000"/>
-              </a:lnSpc>
-              <a:spcBef>
-                <a:spcPts val="1200"/>
-              </a:spcBef>
-              <a:spcAft>
-                <a:spcPct val="0"/>
-              </a:spcAft>
-              <a:buNone/>
-            </a:pPr>
-            <a:r>
-              <a:rPr lang="en-US" altLang="en-US" dirty="0" smtClean="0">
-                <a:latin typeface="Georgia" panose="02040502050405020303" pitchFamily="18" charset="0"/>
-              </a:rPr>
-              <a:t>At the end of the task, we will </a:t>
-            </a:r>
-            <a:r>
-              <a:rPr lang="en-US" altLang="en-US" i="1" dirty="0" smtClean="0">
-                <a:latin typeface="Georgia" panose="02040502050405020303" pitchFamily="18" charset="0"/>
-              </a:rPr>
-              <a:t>randomly choose ten trials </a:t>
-            </a:r>
-            <a:r>
-              <a:rPr lang="en-US" altLang="en-US" dirty="0" smtClean="0">
-                <a:latin typeface="Georgia" panose="02040502050405020303" pitchFamily="18" charset="0"/>
-              </a:rPr>
-              <a:t>and will pay both you and your partner your total earnings for those trials.</a:t>
-            </a:r>
-          </a:p>
-          <a:p>
-            <a:pPr eaLnBrk="0" fontAlgn="base" hangingPunct="0">
-              <a:lnSpc>
-                <a:spcPct val="100000"/>
-              </a:lnSpc>
-              <a:spcBef>
-                <a:spcPts val="1200"/>
-              </a:spcBef>
-              <a:spcAft>
-                <a:spcPct val="0"/>
-              </a:spcAft>
-            </a:pPr>
-            <a:r>
-              <a:rPr lang="en-US" altLang="en-US" dirty="0" smtClean="0">
-                <a:latin typeface="Georgia" panose="02040502050405020303" pitchFamily="18" charset="0"/>
-              </a:rPr>
-              <a:t>Any money earned with the computer will go back into a pool of general lab funds.</a:t>
-            </a:r>
-          </a:p>
-          <a:p>
-            <a:pPr eaLnBrk="0" fontAlgn="base" hangingPunct="0">
-              <a:lnSpc>
-                <a:spcPct val="100000"/>
-              </a:lnSpc>
-              <a:spcBef>
-                <a:spcPts val="1200"/>
-              </a:spcBef>
-              <a:spcAft>
-                <a:spcPct val="0"/>
-              </a:spcAft>
-            </a:pPr>
-            <a:r>
-              <a:rPr lang="en-US" altLang="en-US" dirty="0" smtClean="0">
-                <a:latin typeface="Georgia" panose="02040502050405020303" pitchFamily="18" charset="0"/>
-              </a:rPr>
-              <a:t>There's no penalty for missing a trial, but if we happen to choose a missed trial as one of the random ten, you and your partner can't earn anything for that trial</a:t>
-            </a:r>
-            <a:r>
-              <a:rPr lang="en-US" altLang="en-US" dirty="0" smtClean="0">
-                <a:latin typeface="Georgia" panose="02040502050405020303" pitchFamily="18" charset="0"/>
-              </a:rPr>
-              <a:t>.</a:t>
-            </a:r>
-          </a:p>
-          <a:p>
-            <a:pPr marL="0" indent="0" eaLnBrk="0" fontAlgn="base" hangingPunct="0">
-              <a:lnSpc>
-                <a:spcPct val="100000"/>
-              </a:lnSpc>
-              <a:spcBef>
-                <a:spcPts val="1200"/>
-              </a:spcBef>
-              <a:spcAft>
-                <a:spcPct val="0"/>
-              </a:spcAft>
-              <a:buNone/>
-            </a:pPr>
-            <a:r>
-              <a:rPr lang="en-US" altLang="en-US" dirty="0" smtClean="0">
-                <a:latin typeface="Georgia" panose="02040502050405020303" pitchFamily="18" charset="0"/>
-              </a:rPr>
-              <a:t>After your scan we’ll discuss the possibility of you being a study partner for future participants!</a:t>
-            </a:r>
-            <a:endParaRPr lang="en-US" altLang="en-US" dirty="0">
-              <a:latin typeface="Georgia" panose="02040502050405020303" pitchFamily="18" charset="0"/>
-            </a:endParaRPr>
-          </a:p>
-          <a:p>
-            <a:pPr marL="0" indent="0" eaLnBrk="0" fontAlgn="base" hangingPunct="0">
-              <a:lnSpc>
-                <a:spcPct val="100000"/>
-              </a:lnSpc>
-              <a:spcBef>
-                <a:spcPts val="1200"/>
-              </a:spcBef>
-              <a:spcAft>
-                <a:spcPct val="0"/>
-              </a:spcAft>
-              <a:buNone/>
-            </a:pPr>
-            <a:endParaRPr lang="en-US" altLang="en-US" dirty="0" smtClean="0">
-              <a:latin typeface="Georgia" panose="02040502050405020303" pitchFamily="18" charset="0"/>
-            </a:endParaRPr>
-          </a:p>
-          <a:p>
-            <a:pPr marL="0" indent="0">
-              <a:buNone/>
-            </a:pPr>
-            <a:endParaRPr lang="en-US" altLang="en-US" dirty="0">
-              <a:latin typeface="Georgia" panose="02040502050405020303" pitchFamily="18" charset="0"/>
-            </a:endParaRPr>
-          </a:p>
-          <a:p>
-            <a:pPr marL="0" indent="0" algn="ctr">
-              <a:buNone/>
-            </a:pPr>
-            <a:r>
-              <a:rPr lang="en-US" altLang="en-US" dirty="0" smtClean="0">
-                <a:latin typeface="Georgia" panose="02040502050405020303" pitchFamily="18" charset="0"/>
-              </a:rPr>
-              <a:t>Do you have any questions? We will go through some </a:t>
-            </a:r>
-            <a:r>
-              <a:rPr lang="en-US" altLang="en-US" i="1" dirty="0" smtClean="0">
-                <a:latin typeface="Georgia" panose="02040502050405020303" pitchFamily="18" charset="0"/>
-              </a:rPr>
-              <a:t>practice trials </a:t>
-            </a:r>
-            <a:r>
-              <a:rPr lang="en-US" altLang="en-US" dirty="0" smtClean="0">
-                <a:latin typeface="Georgia" panose="02040502050405020303" pitchFamily="18" charset="0"/>
-              </a:rPr>
-              <a:t>before you complete the actual experiment in the scanner so you can get used to the timing of the task. </a:t>
-            </a:r>
-            <a:r>
-              <a:rPr lang="en-US" altLang="en-US" b="1" dirty="0" smtClean="0">
-                <a:latin typeface="Georgia" panose="02040502050405020303" pitchFamily="18" charset="0"/>
-              </a:rPr>
-              <a:t>Please let us know if anything about the game is unclear. </a:t>
-            </a:r>
-          </a:p>
-          <a:p>
-            <a:endParaRPr lang="en-US" dirty="0">
-              <a:latin typeface="Georgia" panose="02040502050405020303" pitchFamily="18" charset="0"/>
-            </a:endParaRPr>
-          </a:p>
-        </p:txBody>
-      </p:sp>
-    </p:spTree>
-    <p:extLst>
-      <p:ext uri="{BB962C8B-B14F-4D97-AF65-F5344CB8AC3E}">
-        <p14:creationId xmlns:p14="http://schemas.microsoft.com/office/powerpoint/2010/main" val="4208836316"/>
-      </p:ext>
-    </p:extLst>
-  </p:cSld>
-  <p:clrMapOvr>
-    <a:masterClrMapping/>
-  </p:clrMapOvr>
-  <p:timing>
-    <p:tnLst>
-      <p:par>
-        <p:cTn id="1" dur="indefinite" restart="never" nodeType="tmRoot"/>
-      </p:par>
-    </p:tnLst>
-  </p:timing>
-</p:sld>
-</file>
-
-<file path=ppt/slides/slide2.xml><?xml version="1.0" encoding="utf-8"?>
-<p:sld xmlns:a="http://schemas.openxmlformats.org/drawingml/2006/main" xmlns:r="http://schemas.openxmlformats.org/officeDocument/2006/relationships" xmlns:p="http://schemas.openxmlformats.org/presentationml/2006/main">
-  <p:cSld>
-    <p:spTree>
-      <p:nvGrpSpPr>
-        <p:cNvPr id="1" name=""/>
-        <p:cNvGrpSpPr/>
-        <p:nvPr/>
-      </p:nvGrpSpPr>
-      <p:grpSpPr>
-        <a:xfrm>
-          <a:off x="0" y="0"/>
-          <a:ext cx="0" cy="0"/>
-          <a:chOff x="0" y="0"/>
-          <a:chExt cx="0" cy="0"/>
-        </a:xfrm>
-      </p:grpSpPr>
-      <p:sp>
-        <p:nvSpPr>
-          <p:cNvPr id="4" name="Rectangle 1"/>
-          <p:cNvSpPr>
-            <a:spLocks noGrp="1" noChangeArrowheads="1"/>
-          </p:cNvSpPr>
-          <p:nvPr>
-            <p:ph idx="1"/>
-          </p:nvPr>
-        </p:nvSpPr>
-        <p:spPr bwMode="auto">
-          <a:xfrm>
-            <a:off x="838199" y="1234643"/>
-            <a:ext cx="10515600" cy="4524315"/>
-          </a:xfrm>
-          <a:prstGeom prst="rect">
-            <a:avLst/>
-          </a:prstGeom>
-          <a:noFill/>
-          <a:ln>
-            <a:noFill/>
-          </a:ln>
-          <a:effectLst/>
-          <a:extLst>
-            <a:ext uri="{909E8E84-426E-40DD-AFC4-6F175D3DCCD1}">
-              <a14:hiddenFill xmlns:a14="http://schemas.microsoft.com/office/drawing/2010/main">
-                <a:solidFill>
-                  <a:schemeClr val="accent1"/>
-                </a:solidFill>
-              </a14:hiddenFill>
-            </a:ext>
-            <a:ext uri="{91240B29-F687-4F45-9708-019B960494DF}">
-              <a14:hiddenLine xmlns:a14="http://schemas.microsoft.com/office/drawing/2010/main" w="9525">
-                <a:solidFill>
-                  <a:schemeClr val="tx1"/>
-                </a:solidFill>
-                <a:miter lim="800000"/>
-                <a:headEnd/>
-                <a:tailEnd/>
-              </a14:hiddenLine>
-            </a:ext>
-            <a:ext uri="{AF507438-7753-43E0-B8FC-AC1667EBCBE1}">
-              <a14:hiddenEffects xmlns:a14="http://schemas.microsoft.com/office/drawing/2010/main">
-                <a:effectLst>
-                  <a:outerShdw dist="35921" dir="2700000" algn="ctr" rotWithShape="0">
-                    <a:schemeClr val="bg2"/>
-                  </a:outerShdw>
-                </a:effectLst>
-              </a14:hiddenEffects>
-            </a:ext>
-          </a:extLst>
-        </p:spPr>
-        <p:txBody>
-          <a:bodyPr vert="horz" wrap="square" lIns="91440" tIns="45720" rIns="91440" bIns="45720" numCol="1" anchor="ctr" anchorCtr="0" compatLnSpc="1">
-            <a:prstTxWarp prst="textNoShape">
-              <a:avLst/>
-            </a:prstTxWarp>
-            <a:spAutoFit/>
-          </a:bodyPr>
-          <a:lstStyle/>
-          <a:p>
-            <a:pPr marL="0" marR="0" lvl="0" indent="0" algn="ctr" defTabSz="914400" rtl="0" eaLnBrk="0" fontAlgn="base" latinLnBrk="0" hangingPunct="0">
-              <a:lnSpc>
-                <a:spcPct val="100000"/>
-              </a:lnSpc>
-              <a:spcBef>
-                <a:spcPct val="0"/>
-              </a:spcBef>
-              <a:spcAft>
-                <a:spcPct val="0"/>
-              </a:spcAft>
-              <a:buClrTx/>
-              <a:buSzTx/>
-              <a:buFontTx/>
-              <a:buNone/>
-              <a:tabLst/>
-            </a:pPr>
-            <a:r>
-              <a:rPr kumimoji="0" lang="en-US" altLang="en-US" sz="3200" b="0" i="0" u="none" strike="noStrike" cap="none" normalizeH="0" baseline="0" dirty="0" smtClean="0">
-                <a:ln>
-                  <a:noFill/>
-                </a:ln>
-                <a:solidFill>
-                  <a:schemeClr val="tx1"/>
-                </a:solidFill>
-                <a:effectLst/>
-                <a:latin typeface="Georgia" panose="02040502050405020303" pitchFamily="18" charset="0"/>
-              </a:rPr>
-              <a:t>Thanks for coming in to participate in our study!</a:t>
-            </a:r>
-          </a:p>
-          <a:p>
-            <a:pPr marL="0" marR="0" lvl="0" indent="0" algn="ctr" defTabSz="914400" rtl="0" eaLnBrk="0" fontAlgn="base" latinLnBrk="0" hangingPunct="0">
-              <a:lnSpc>
-                <a:spcPct val="100000"/>
-              </a:lnSpc>
-              <a:spcBef>
-                <a:spcPct val="0"/>
-              </a:spcBef>
-              <a:spcAft>
-                <a:spcPct val="0"/>
-              </a:spcAft>
-              <a:buClrTx/>
-              <a:buSzTx/>
-              <a:buFontTx/>
-              <a:buNone/>
-              <a:tabLst/>
-            </a:pPr>
-            <a:endParaRPr lang="en-US" altLang="en-US" sz="3200" dirty="0">
-              <a:latin typeface="Georgia" panose="02040502050405020303" pitchFamily="18" charset="0"/>
-            </a:endParaRPr>
-          </a:p>
-          <a:p>
-            <a:pPr marL="0" marR="0" lvl="0" indent="0" algn="ctr" defTabSz="914400" rtl="0" eaLnBrk="0" fontAlgn="base" latinLnBrk="0" hangingPunct="0">
-              <a:lnSpc>
-                <a:spcPct val="100000"/>
-              </a:lnSpc>
-              <a:spcBef>
-                <a:spcPct val="0"/>
-              </a:spcBef>
-              <a:spcAft>
-                <a:spcPct val="0"/>
-              </a:spcAft>
-              <a:buClrTx/>
-              <a:buSzTx/>
-              <a:buFontTx/>
-              <a:buNone/>
-              <a:tabLst/>
-            </a:pPr>
-            <a:r>
-              <a:rPr kumimoji="0" lang="en-US" altLang="en-US" sz="3200" b="0" i="0" u="none" strike="noStrike" cap="none" normalizeH="0" baseline="0" dirty="0" smtClean="0">
-                <a:ln>
-                  <a:noFill/>
-                </a:ln>
-                <a:solidFill>
-                  <a:schemeClr val="tx1"/>
-                </a:solidFill>
-                <a:effectLst/>
-                <a:latin typeface="Georgia" panose="02040502050405020303" pitchFamily="18" charset="0"/>
-              </a:rPr>
-              <a:t>Welcome to th</a:t>
-            </a:r>
-            <a:r>
-              <a:rPr lang="en-US" altLang="en-US" sz="3200" dirty="0" smtClean="0">
-                <a:latin typeface="Georgia" panose="02040502050405020303" pitchFamily="18" charset="0"/>
-              </a:rPr>
-              <a:t>e mock scanner. Here we are going to practice the task </a:t>
-            </a:r>
-            <a:r>
-              <a:rPr kumimoji="0" lang="en-US" altLang="en-US" sz="3200" b="0" i="0" u="none" strike="noStrike" cap="none" normalizeH="0" baseline="0" dirty="0" smtClean="0">
-                <a:ln>
-                  <a:noFill/>
-                </a:ln>
-                <a:solidFill>
-                  <a:schemeClr val="tx1"/>
-                </a:solidFill>
-                <a:effectLst/>
-                <a:latin typeface="Georgia" panose="02040502050405020303" pitchFamily="18" charset="0"/>
-              </a:rPr>
-              <a:t>that you will soon complete 6 repetitions of in the MRI machine.</a:t>
-            </a:r>
-          </a:p>
-          <a:p>
-            <a:pPr marL="0" marR="0" lvl="0" indent="0" algn="ctr" defTabSz="914400" rtl="0" eaLnBrk="0" fontAlgn="base" latinLnBrk="0" hangingPunct="0">
-              <a:lnSpc>
-                <a:spcPct val="100000"/>
-              </a:lnSpc>
-              <a:spcBef>
-                <a:spcPct val="0"/>
-              </a:spcBef>
-              <a:spcAft>
-                <a:spcPct val="0"/>
-              </a:spcAft>
-              <a:buClrTx/>
-              <a:buSzTx/>
-              <a:buFontTx/>
-              <a:buNone/>
-              <a:tabLst/>
-            </a:pPr>
-            <a:endParaRPr lang="en-US" altLang="en-US" sz="3200" dirty="0">
-              <a:latin typeface="Georgia" panose="02040502050405020303" pitchFamily="18" charset="0"/>
-            </a:endParaRPr>
-          </a:p>
-          <a:p>
-            <a:pPr marL="0" indent="0" algn="ctr" eaLnBrk="0" fontAlgn="base" hangingPunct="0">
-              <a:lnSpc>
-                <a:spcPct val="100000"/>
-              </a:lnSpc>
-              <a:spcBef>
-                <a:spcPct val="0"/>
-              </a:spcBef>
-              <a:spcAft>
-                <a:spcPct val="0"/>
-              </a:spcAft>
-              <a:buNone/>
-            </a:pPr>
-            <a:r>
-              <a:rPr lang="en-US" altLang="en-US" sz="3200" dirty="0" smtClean="0">
-                <a:latin typeface="Georgia" panose="02040502050405020303" pitchFamily="18" charset="0"/>
-              </a:rPr>
-              <a:t>Today you’ll be playing a game called the</a:t>
-            </a:r>
-            <a:br>
-              <a:rPr lang="en-US" altLang="en-US" sz="3200" dirty="0" smtClean="0">
-                <a:latin typeface="Georgia" panose="02040502050405020303" pitchFamily="18" charset="0"/>
-              </a:rPr>
-            </a:br>
-            <a:r>
-              <a:rPr lang="en-US" altLang="en-US" sz="3200" dirty="0" smtClean="0">
-                <a:latin typeface="Georgia" panose="02040502050405020303" pitchFamily="18" charset="0"/>
-              </a:rPr>
-              <a:t>Card Guessing Game.</a:t>
-            </a:r>
-          </a:p>
-          <a:p>
-            <a:pPr marL="0" indent="0" eaLnBrk="0" fontAlgn="base" hangingPunct="0">
-              <a:lnSpc>
-                <a:spcPct val="100000"/>
-              </a:lnSpc>
-              <a:spcBef>
-                <a:spcPct val="0"/>
-              </a:spcBef>
-              <a:spcAft>
-                <a:spcPct val="0"/>
-              </a:spcAft>
-              <a:buNone/>
-            </a:pPr>
-            <a:endParaRPr lang="en-US" altLang="en-US" sz="3200" dirty="0">
-              <a:latin typeface="Georgia" panose="02040502050405020303" pitchFamily="18" charset="0"/>
-            </a:endParaRPr>
-          </a:p>
-        </p:txBody>
-      </p:sp>
-    </p:spTree>
-    <p:extLst>
-      <p:ext uri="{BB962C8B-B14F-4D97-AF65-F5344CB8AC3E}">
-        <p14:creationId xmlns:p14="http://schemas.microsoft.com/office/powerpoint/2010/main" val="4222355743"/>
-      </p:ext>
-    </p:extLst>
-  </p:cSld>
-  <p:clrMapOvr>
-    <a:masterClrMapping/>
-  </p:clrMapOvr>
-  <p:timing>
-    <p:tnLst>
-      <p:par>
-        <p:cTn id="1" dur="indefinite" restart="never" nodeType="tmRoot"/>
-      </p:par>
-    </p:tnLst>
-  </p:timing>
-</p:sld>
-</file>
-
-<file path=ppt/slides/slide3.xml><?xml version="1.0" encoding="utf-8"?>
-<p:sld xmlns:a="http://schemas.openxmlformats.org/drawingml/2006/main" xmlns:r="http://schemas.openxmlformats.org/officeDocument/2006/relationships" xmlns:p="http://schemas.openxmlformats.org/presentationml/2006/main">
-  <p:cSld>
-    <p:spTree>
-      <p:nvGrpSpPr>
-        <p:cNvPr id="1" name=""/>
-        <p:cNvGrpSpPr/>
-        <p:nvPr/>
-      </p:nvGrpSpPr>
-      <p:grpSpPr>
-        <a:xfrm>
-          <a:off x="0" y="0"/>
-          <a:ext cx="0" cy="0"/>
-          <a:chOff x="0" y="0"/>
-          <a:chExt cx="0" cy="0"/>
-        </a:xfrm>
-      </p:grpSpPr>
-      <p:sp>
-        <p:nvSpPr>
-          <p:cNvPr id="3" name="Content Placeholder 2"/>
-          <p:cNvSpPr>
-            <a:spLocks noGrp="1"/>
-          </p:cNvSpPr>
-          <p:nvPr>
-            <p:ph idx="1"/>
-          </p:nvPr>
-        </p:nvSpPr>
-        <p:spPr>
-          <a:xfrm>
-            <a:off x="974835" y="1436743"/>
-            <a:ext cx="10515600" cy="4351338"/>
-          </a:xfrm>
-        </p:spPr>
-        <p:txBody>
-          <a:bodyPr>
-            <a:normAutofit/>
-          </a:bodyPr>
-          <a:lstStyle/>
-          <a:p>
-            <a:pPr marL="0" indent="0" eaLnBrk="0" fontAlgn="base" hangingPunct="0">
-              <a:lnSpc>
-                <a:spcPct val="100000"/>
-              </a:lnSpc>
-              <a:spcBef>
-                <a:spcPct val="0"/>
-              </a:spcBef>
-              <a:spcAft>
-                <a:spcPts val="600"/>
-              </a:spcAft>
-              <a:buNone/>
-            </a:pPr>
-            <a:r>
-              <a:rPr lang="en-US" altLang="en-US" dirty="0">
-                <a:latin typeface="Georgia" panose="02040502050405020303" pitchFamily="18" charset="0"/>
-              </a:rPr>
-              <a:t>In this game, all you have to do on each trial of the task is guess whether the value of a card that appears on the screen is higher or lower than the number </a:t>
-            </a:r>
-            <a:r>
-              <a:rPr lang="en-US" altLang="en-US" dirty="0" smtClean="0">
-                <a:latin typeface="Georgia" panose="02040502050405020303" pitchFamily="18" charset="0"/>
-              </a:rPr>
-              <a:t>5.</a:t>
-            </a:r>
-            <a:endParaRPr lang="en-US" altLang="en-US" dirty="0">
-              <a:latin typeface="Georgia" panose="02040502050405020303" pitchFamily="18" charset="0"/>
-            </a:endParaRPr>
-          </a:p>
-          <a:p>
-            <a:pPr marL="0" indent="0" eaLnBrk="0" fontAlgn="base" hangingPunct="0">
-              <a:lnSpc>
-                <a:spcPct val="100000"/>
-              </a:lnSpc>
-              <a:spcBef>
-                <a:spcPct val="0"/>
-              </a:spcBef>
-              <a:spcAft>
-                <a:spcPts val="600"/>
-              </a:spcAft>
-              <a:buNone/>
-            </a:pPr>
-            <a:endParaRPr lang="en-US" altLang="en-US" dirty="0">
-              <a:latin typeface="Georgia" panose="02040502050405020303" pitchFamily="18" charset="0"/>
-            </a:endParaRPr>
-          </a:p>
-          <a:p>
-            <a:pPr marL="0" indent="0" eaLnBrk="0" fontAlgn="base" hangingPunct="0">
-              <a:lnSpc>
-                <a:spcPct val="100000"/>
-              </a:lnSpc>
-              <a:spcBef>
-                <a:spcPct val="0"/>
-              </a:spcBef>
-              <a:spcAft>
-                <a:spcPts val="600"/>
-              </a:spcAft>
-              <a:buNone/>
-            </a:pPr>
-            <a:r>
-              <a:rPr lang="en-US" altLang="en-US" dirty="0">
-                <a:latin typeface="Georgia" panose="02040502050405020303" pitchFamily="18" charset="0"/>
-              </a:rPr>
-              <a:t>The number on the card can be between 1 and </a:t>
-            </a:r>
-            <a:r>
-              <a:rPr lang="en-US" altLang="en-US" dirty="0" smtClean="0">
-                <a:latin typeface="Georgia" panose="02040502050405020303" pitchFamily="18" charset="0"/>
-              </a:rPr>
-              <a:t>10.</a:t>
-            </a:r>
-          </a:p>
-          <a:p>
-            <a:pPr eaLnBrk="0" fontAlgn="base" hangingPunct="0">
-              <a:lnSpc>
-                <a:spcPct val="100000"/>
-              </a:lnSpc>
-              <a:spcBef>
-                <a:spcPct val="0"/>
-              </a:spcBef>
-              <a:spcAft>
-                <a:spcPts val="600"/>
-              </a:spcAft>
-            </a:pPr>
-            <a:r>
-              <a:rPr lang="en-US" altLang="en-US" dirty="0" smtClean="0">
-                <a:latin typeface="Georgia" panose="02040502050405020303" pitchFamily="18" charset="0"/>
-              </a:rPr>
-              <a:t>If </a:t>
-            </a:r>
-            <a:r>
-              <a:rPr lang="en-US" altLang="en-US" dirty="0">
-                <a:latin typeface="Georgia" panose="02040502050405020303" pitchFamily="18" charset="0"/>
-              </a:rPr>
-              <a:t>you guess correctly, you will earn $10 for that </a:t>
-            </a:r>
-            <a:r>
-              <a:rPr lang="en-US" altLang="en-US" dirty="0" smtClean="0">
-                <a:latin typeface="Georgia" panose="02040502050405020303" pitchFamily="18" charset="0"/>
-              </a:rPr>
-              <a:t>trial.</a:t>
-            </a:r>
-            <a:endParaRPr lang="en-US" altLang="en-US" dirty="0">
-              <a:latin typeface="Georgia" panose="02040502050405020303" pitchFamily="18" charset="0"/>
-            </a:endParaRPr>
-          </a:p>
-          <a:p>
-            <a:pPr eaLnBrk="0" fontAlgn="base" hangingPunct="0">
-              <a:lnSpc>
-                <a:spcPct val="100000"/>
-              </a:lnSpc>
-              <a:spcBef>
-                <a:spcPct val="0"/>
-              </a:spcBef>
-              <a:spcAft>
-                <a:spcPts val="600"/>
-              </a:spcAft>
-            </a:pPr>
-            <a:r>
-              <a:rPr lang="en-US" altLang="en-US" dirty="0" smtClean="0">
-                <a:latin typeface="Georgia" panose="02040502050405020303" pitchFamily="18" charset="0"/>
-              </a:rPr>
-              <a:t>If </a:t>
-            </a:r>
-            <a:r>
-              <a:rPr lang="en-US" altLang="en-US" dirty="0">
-                <a:latin typeface="Georgia" panose="02040502050405020303" pitchFamily="18" charset="0"/>
-              </a:rPr>
-              <a:t>you guess incorrectly, you will lose $5 for that </a:t>
-            </a:r>
-            <a:r>
-              <a:rPr lang="en-US" altLang="en-US" dirty="0" smtClean="0">
-                <a:latin typeface="Georgia" panose="02040502050405020303" pitchFamily="18" charset="0"/>
-              </a:rPr>
-              <a:t>trial.</a:t>
-            </a:r>
-          </a:p>
-          <a:p>
-            <a:pPr eaLnBrk="0" fontAlgn="base" hangingPunct="0">
-              <a:lnSpc>
-                <a:spcPct val="100000"/>
-              </a:lnSpc>
-              <a:spcBef>
-                <a:spcPct val="0"/>
-              </a:spcBef>
-              <a:spcAft>
-                <a:spcPts val="600"/>
-              </a:spcAft>
-            </a:pPr>
-            <a:r>
-              <a:rPr lang="en-US" altLang="en-US" dirty="0" smtClean="0">
-                <a:latin typeface="Georgia" panose="02040502050405020303" pitchFamily="18" charset="0"/>
-              </a:rPr>
-              <a:t>If </a:t>
-            </a:r>
-            <a:r>
-              <a:rPr lang="en-US" altLang="en-US" dirty="0">
-                <a:latin typeface="Georgia" panose="02040502050405020303" pitchFamily="18" charset="0"/>
-              </a:rPr>
-              <a:t>the card number is exactly 5, nothing happens.</a:t>
-            </a:r>
-          </a:p>
-        </p:txBody>
-      </p:sp>
-    </p:spTree>
-    <p:extLst>
-      <p:ext uri="{BB962C8B-B14F-4D97-AF65-F5344CB8AC3E}">
-        <p14:creationId xmlns:p14="http://schemas.microsoft.com/office/powerpoint/2010/main" val="1160729909"/>
-      </p:ext>
-    </p:extLst>
-  </p:cSld>
-  <p:clrMapOvr>
-    <a:masterClrMapping/>
-  </p:clrMapOvr>
-  <p:timing>
-    <p:tnLst>
-      <p:par>
-        <p:cTn id="1" dur="indefinite" restart="never" nodeType="tmRoot"/>
-      </p:par>
-    </p:tnLst>
-  </p:timing>
-</p:sld>
-</file>
-
-<file path=ppt/slides/slide4.xml><?xml version="1.0" encoding="utf-8"?>
-<p:sld xmlns:a="http://schemas.openxmlformats.org/drawingml/2006/main" xmlns:r="http://schemas.openxmlformats.org/officeDocument/2006/relationships" xmlns:p="http://schemas.openxmlformats.org/presentationml/2006/main">
-  <p:cSld>
-    <p:spTree>
-      <p:nvGrpSpPr>
-        <p:cNvPr id="1" name=""/>
-        <p:cNvGrpSpPr/>
-        <p:nvPr/>
-      </p:nvGrpSpPr>
-      <p:grpSpPr>
-        <a:xfrm>
-          <a:off x="0" y="0"/>
-          <a:ext cx="0" cy="0"/>
-          <a:chOff x="0" y="0"/>
-          <a:chExt cx="0" cy="0"/>
-        </a:xfrm>
-      </p:grpSpPr>
-      <p:sp>
-        <p:nvSpPr>
-          <p:cNvPr id="3" name="Content Placeholder 2"/>
-          <p:cNvSpPr>
-            <a:spLocks noGrp="1"/>
-          </p:cNvSpPr>
-          <p:nvPr>
-            <p:ph idx="1"/>
-          </p:nvPr>
-        </p:nvSpPr>
-        <p:spPr>
-          <a:xfrm>
-            <a:off x="838200" y="1594397"/>
-            <a:ext cx="10515600" cy="4351338"/>
-          </a:xfrm>
-        </p:spPr>
-        <p:txBody>
-          <a:bodyPr>
-            <a:normAutofit/>
-          </a:bodyPr>
-          <a:lstStyle/>
-          <a:p>
-            <a:pPr marL="0" lvl="0" indent="0" algn="ctr" eaLnBrk="0" fontAlgn="base" hangingPunct="0">
-              <a:lnSpc>
-                <a:spcPct val="100000"/>
-              </a:lnSpc>
-              <a:spcBef>
-                <a:spcPct val="0"/>
-              </a:spcBef>
-              <a:spcAft>
-                <a:spcPct val="0"/>
-              </a:spcAft>
-              <a:buNone/>
-            </a:pPr>
-            <a:r>
-              <a:rPr lang="en-US" altLang="en-US" dirty="0" smtClean="0">
-                <a:latin typeface="Georgia" panose="02040502050405020303" pitchFamily="18" charset="0"/>
-              </a:rPr>
-              <a:t>Importantly, you will be playing with </a:t>
-            </a:r>
-            <a:r>
-              <a:rPr lang="en-US" altLang="en-US" b="1" dirty="0" smtClean="0">
-                <a:latin typeface="Georgia" panose="02040502050405020303" pitchFamily="18" charset="0"/>
-              </a:rPr>
-              <a:t>2 partners today </a:t>
-            </a:r>
-            <a:r>
-              <a:rPr lang="en-US" altLang="en-US" dirty="0" smtClean="0">
-                <a:latin typeface="Georgia" panose="02040502050405020303" pitchFamily="18" charset="0"/>
-              </a:rPr>
-              <a:t>and you will be </a:t>
-            </a:r>
-            <a:r>
-              <a:rPr lang="en-US" altLang="en-US" i="1" dirty="0" smtClean="0">
-                <a:latin typeface="Georgia" panose="02040502050405020303" pitchFamily="18" charset="0"/>
-              </a:rPr>
-              <a:t>sharing</a:t>
-            </a:r>
-            <a:r>
-              <a:rPr lang="en-US" altLang="en-US" dirty="0" smtClean="0">
-                <a:latin typeface="Georgia" panose="02040502050405020303" pitchFamily="18" charset="0"/>
-              </a:rPr>
-              <a:t> the monetary outcomes of the task with them.</a:t>
-            </a:r>
-          </a:p>
-          <a:p>
-            <a:pPr marL="0" lvl="0" indent="0" algn="ctr" eaLnBrk="0" fontAlgn="base" hangingPunct="0">
-              <a:lnSpc>
-                <a:spcPct val="100000"/>
-              </a:lnSpc>
-              <a:spcBef>
-                <a:spcPct val="0"/>
-              </a:spcBef>
-              <a:spcAft>
-                <a:spcPct val="0"/>
-              </a:spcAft>
-              <a:buNone/>
-            </a:pPr>
-            <a:endParaRPr lang="en-US" altLang="en-US" dirty="0">
-              <a:latin typeface="Georgia" panose="02040502050405020303" pitchFamily="18" charset="0"/>
-            </a:endParaRPr>
-          </a:p>
-          <a:p>
-            <a:pPr marL="0" lvl="0" indent="0" algn="ctr" eaLnBrk="0" fontAlgn="base" hangingPunct="0">
-              <a:lnSpc>
-                <a:spcPct val="100000"/>
-              </a:lnSpc>
-              <a:spcBef>
-                <a:spcPct val="0"/>
-              </a:spcBef>
-              <a:spcAft>
-                <a:spcPct val="0"/>
-              </a:spcAft>
-              <a:buNone/>
-            </a:pPr>
-            <a:r>
-              <a:rPr lang="en-US" altLang="en-US" dirty="0" smtClean="0">
-                <a:latin typeface="Georgia" panose="02040502050405020303" pitchFamily="18" charset="0"/>
-              </a:rPr>
-              <a:t>Sometimes you will be playing with a computer, and other times you will be playing with a stranger.</a:t>
-            </a:r>
-          </a:p>
-          <a:p>
-            <a:pPr marL="0" lvl="0" indent="0" algn="ctr" eaLnBrk="0" fontAlgn="base" hangingPunct="0">
-              <a:lnSpc>
-                <a:spcPct val="100000"/>
-              </a:lnSpc>
-              <a:spcBef>
-                <a:spcPct val="0"/>
-              </a:spcBef>
-              <a:spcAft>
-                <a:spcPct val="0"/>
-              </a:spcAft>
-              <a:buNone/>
-            </a:pPr>
-            <a:endParaRPr lang="en-US" altLang="en-US" dirty="0">
-              <a:latin typeface="Georgia" panose="02040502050405020303" pitchFamily="18" charset="0"/>
-            </a:endParaRPr>
-          </a:p>
-          <a:p>
-            <a:pPr marL="0" lvl="0" indent="0" algn="ctr" eaLnBrk="0" fontAlgn="base" hangingPunct="0">
-              <a:lnSpc>
-                <a:spcPct val="100000"/>
-              </a:lnSpc>
-              <a:spcBef>
-                <a:spcPct val="0"/>
-              </a:spcBef>
-              <a:spcAft>
-                <a:spcPct val="0"/>
-              </a:spcAft>
-              <a:buNone/>
-            </a:pPr>
-            <a:r>
-              <a:rPr lang="en-US" altLang="en-US" dirty="0" smtClean="0">
-                <a:latin typeface="Georgia" panose="02040502050405020303" pitchFamily="18" charset="0"/>
-              </a:rPr>
-              <a:t>This person is a real individual who has participated in our study recently, and who will receive payment based on your performance in the task, but whom you won’t get to meet.   </a:t>
-            </a:r>
-          </a:p>
-        </p:txBody>
-      </p:sp>
-    </p:spTree>
-    <p:extLst>
-      <p:ext uri="{BB962C8B-B14F-4D97-AF65-F5344CB8AC3E}">
-        <p14:creationId xmlns:p14="http://schemas.microsoft.com/office/powerpoint/2010/main" val="1520064628"/>
-      </p:ext>
-    </p:extLst>
-  </p:cSld>
-  <p:clrMapOvr>
-    <a:masterClrMapping/>
-  </p:clrMapOvr>
-  <p:timing>
-    <p:tnLst>
-      <p:par>
-        <p:cTn id="1" dur="indefinite" restart="never" nodeType="tmRoot"/>
-      </p:par>
-    </p:tnLst>
-  </p:timing>
-</p:sld>
-</file>
-
-<file path=ppt/slides/slide5.xml><?xml version="1.0" encoding="utf-8"?>
-<p:sld xmlns:a="http://schemas.openxmlformats.org/drawingml/2006/main" xmlns:r="http://schemas.openxmlformats.org/officeDocument/2006/relationships" xmlns:p="http://schemas.openxmlformats.org/presentationml/2006/main">
-  <p:cSld>
-    <p:spTree>
-      <p:nvGrpSpPr>
-        <p:cNvPr id="1" name=""/>
-        <p:cNvGrpSpPr/>
-        <p:nvPr/>
-      </p:nvGrpSpPr>
-      <p:grpSpPr>
-        <a:xfrm>
-          <a:off x="0" y="0"/>
-          <a:ext cx="0" cy="0"/>
-          <a:chOff x="0" y="0"/>
-          <a:chExt cx="0" cy="0"/>
-        </a:xfrm>
-      </p:grpSpPr>
-      <p:sp>
-        <p:nvSpPr>
-          <p:cNvPr id="3" name="Content Placeholder 2"/>
-          <p:cNvSpPr>
-            <a:spLocks noGrp="1"/>
-          </p:cNvSpPr>
-          <p:nvPr>
-            <p:ph idx="1"/>
-          </p:nvPr>
-        </p:nvSpPr>
-        <p:spPr>
-          <a:xfrm>
-            <a:off x="869731" y="1426232"/>
-            <a:ext cx="10515600" cy="4351338"/>
-          </a:xfrm>
-        </p:spPr>
-        <p:txBody>
-          <a:bodyPr>
-            <a:normAutofit fontScale="92500" lnSpcReduction="20000"/>
-          </a:bodyPr>
-          <a:lstStyle/>
-          <a:p>
-            <a:pPr marL="0" lvl="0" indent="0" eaLnBrk="0" fontAlgn="base" hangingPunct="0">
-              <a:lnSpc>
-                <a:spcPct val="100000"/>
-              </a:lnSpc>
-              <a:spcBef>
-                <a:spcPct val="0"/>
-              </a:spcBef>
-              <a:spcAft>
-                <a:spcPts val="600"/>
-              </a:spcAft>
-              <a:buNone/>
-            </a:pPr>
-            <a:r>
-              <a:rPr lang="en-US" altLang="en-US" dirty="0" smtClean="0">
-                <a:latin typeface="Georgia" panose="02040502050405020303" pitchFamily="18" charset="0"/>
-              </a:rPr>
-              <a:t>You will know which partner you are playing with on a given set of trials by the </a:t>
-            </a:r>
-            <a:r>
-              <a:rPr lang="en-US" altLang="en-US" i="1" dirty="0" smtClean="0">
-                <a:latin typeface="Georgia" panose="02040502050405020303" pitchFamily="18" charset="0"/>
-              </a:rPr>
-              <a:t>image that appears at the top of the screen </a:t>
-            </a:r>
-            <a:r>
-              <a:rPr lang="en-US" altLang="en-US" dirty="0" smtClean="0">
-                <a:latin typeface="Georgia" panose="02040502050405020303" pitchFamily="18" charset="0"/>
-              </a:rPr>
-              <a:t>above the card.</a:t>
-            </a:r>
-          </a:p>
-          <a:p>
-            <a:pPr eaLnBrk="0" fontAlgn="base" hangingPunct="0">
-              <a:lnSpc>
-                <a:spcPct val="100000"/>
-              </a:lnSpc>
-              <a:spcBef>
-                <a:spcPct val="0"/>
-              </a:spcBef>
-              <a:spcAft>
-                <a:spcPts val="600"/>
-              </a:spcAft>
-            </a:pPr>
-            <a:r>
-              <a:rPr lang="en-US" altLang="en-US" dirty="0" smtClean="0">
-                <a:latin typeface="Georgia" panose="02040502050405020303" pitchFamily="18" charset="0"/>
-              </a:rPr>
-              <a:t>The card will appear in the middle of the screen on each trial with a </a:t>
-            </a:r>
-            <a:r>
-              <a:rPr lang="en-US" altLang="en-US" b="1" dirty="0" smtClean="0">
-                <a:latin typeface="Georgia" panose="02040502050405020303" pitchFamily="18" charset="0"/>
-              </a:rPr>
-              <a:t>question mark </a:t>
-            </a:r>
-            <a:r>
-              <a:rPr lang="en-US" altLang="en-US" dirty="0" smtClean="0">
-                <a:latin typeface="Georgia" panose="02040502050405020303" pitchFamily="18" charset="0"/>
-              </a:rPr>
-              <a:t>inside.</a:t>
-            </a:r>
-          </a:p>
-          <a:p>
-            <a:pPr eaLnBrk="0" fontAlgn="base" hangingPunct="0">
-              <a:lnSpc>
-                <a:spcPct val="100000"/>
-              </a:lnSpc>
-              <a:spcBef>
-                <a:spcPct val="0"/>
-              </a:spcBef>
-              <a:spcAft>
-                <a:spcPts val="600"/>
-              </a:spcAft>
-            </a:pPr>
-            <a:r>
-              <a:rPr lang="en-US" altLang="en-US" dirty="0" smtClean="0">
-                <a:latin typeface="Georgia" panose="02040502050405020303" pitchFamily="18" charset="0"/>
-              </a:rPr>
-              <a:t>The question mark will remain on the screen for approximately </a:t>
-            </a:r>
-            <a:r>
-              <a:rPr lang="en-US" altLang="en-US" b="1" dirty="0" smtClean="0">
-                <a:latin typeface="Georgia" panose="02040502050405020303" pitchFamily="18" charset="0"/>
-              </a:rPr>
-              <a:t>2.5 seconds</a:t>
-            </a:r>
-            <a:r>
-              <a:rPr lang="en-US" altLang="en-US" dirty="0" smtClean="0">
-                <a:latin typeface="Georgia" panose="02040502050405020303" pitchFamily="18" charset="0"/>
-              </a:rPr>
-              <a:t>, and during this time you have to enter your guess regarding the card value.</a:t>
-            </a:r>
-          </a:p>
-          <a:p>
-            <a:pPr marL="0" lvl="0" indent="0" eaLnBrk="0" fontAlgn="base" hangingPunct="0">
-              <a:lnSpc>
-                <a:spcPct val="100000"/>
-              </a:lnSpc>
-              <a:spcBef>
-                <a:spcPct val="0"/>
-              </a:spcBef>
-              <a:spcAft>
-                <a:spcPct val="0"/>
-              </a:spcAft>
-              <a:buNone/>
-            </a:pPr>
-            <a:endParaRPr lang="en-US" altLang="en-US" dirty="0">
-              <a:latin typeface="Georgia" panose="02040502050405020303" pitchFamily="18" charset="0"/>
-            </a:endParaRPr>
-          </a:p>
-          <a:p>
-            <a:pPr marL="0" lvl="0" indent="0" eaLnBrk="0" fontAlgn="base" hangingPunct="0">
-              <a:lnSpc>
-                <a:spcPct val="100000"/>
-              </a:lnSpc>
-              <a:spcBef>
-                <a:spcPct val="0"/>
-              </a:spcBef>
-              <a:spcAft>
-                <a:spcPct val="0"/>
-              </a:spcAft>
-              <a:buNone/>
-            </a:pPr>
-            <a:r>
-              <a:rPr lang="en-US" altLang="en-US" dirty="0" smtClean="0">
-                <a:latin typeface="Georgia" panose="02040502050405020303" pitchFamily="18" charset="0"/>
-              </a:rPr>
-              <a:t>Press with your </a:t>
-            </a:r>
-            <a:r>
-              <a:rPr lang="en-US" altLang="en-US" i="1" dirty="0" smtClean="0">
-                <a:latin typeface="Georgia" panose="02040502050405020303" pitchFamily="18" charset="0"/>
-              </a:rPr>
-              <a:t>left index finger </a:t>
-            </a:r>
-            <a:r>
-              <a:rPr lang="en-US" altLang="en-US" dirty="0" smtClean="0">
-                <a:latin typeface="Georgia" panose="02040502050405020303" pitchFamily="18" charset="0"/>
-              </a:rPr>
-              <a:t>if you think the card will be lower than 5, and press with your </a:t>
-            </a:r>
-            <a:r>
-              <a:rPr lang="en-US" altLang="en-US" i="1" dirty="0" smtClean="0">
-                <a:latin typeface="Georgia" panose="02040502050405020303" pitchFamily="18" charset="0"/>
-              </a:rPr>
-              <a:t>right index finger</a:t>
-            </a:r>
-            <a:r>
-              <a:rPr lang="en-US" altLang="en-US" dirty="0" smtClean="0">
-                <a:latin typeface="Georgia" panose="02040502050405020303" pitchFamily="18" charset="0"/>
-              </a:rPr>
-              <a:t> if you think the card will be higher than 5.</a:t>
-            </a:r>
-          </a:p>
-        </p:txBody>
-      </p:sp>
-    </p:spTree>
-    <p:extLst>
-      <p:ext uri="{BB962C8B-B14F-4D97-AF65-F5344CB8AC3E}">
-        <p14:creationId xmlns:p14="http://schemas.microsoft.com/office/powerpoint/2010/main" val="1792649367"/>
-      </p:ext>
-    </p:extLst>
-  </p:cSld>
-  <p:clrMapOvr>
-    <a:masterClrMapping/>
-  </p:clrMapOvr>
-  <p:timing>
-    <p:tnLst>
-      <p:par>
-        <p:cTn id="1" dur="indefinite" restart="never" nodeType="tmRoot"/>
-      </p:par>
-    </p:tnLst>
-  </p:timing>
-</p:sld>
-</file>
-
-<file path=ppt/slides/slide6.xml><?xml version="1.0" encoding="utf-8"?>
-<p:sld xmlns:a="http://schemas.openxmlformats.org/drawingml/2006/main" xmlns:r="http://schemas.openxmlformats.org/officeDocument/2006/relationships" xmlns:p="http://schemas.openxmlformats.org/presentationml/2006/main">
-  <p:cSld>
-    <p:spTree>
-      <p:nvGrpSpPr>
-        <p:cNvPr id="1" name=""/>
-        <p:cNvGrpSpPr/>
-        <p:nvPr/>
-      </p:nvGrpSpPr>
-      <p:grpSpPr>
-        <a:xfrm>
-          <a:off x="0" y="0"/>
-          <a:ext cx="0" cy="0"/>
-          <a:chOff x="0" y="0"/>
-          <a:chExt cx="0" cy="0"/>
-        </a:xfrm>
-      </p:grpSpPr>
-      <p:pic>
-        <p:nvPicPr>
-          <p:cNvPr id="4" name="Content Placeholder 3"/>
-          <p:cNvPicPr>
-            <a:picLocks noGrp="1" noChangeAspect="1"/>
-          </p:cNvPicPr>
-          <p:nvPr>
-            <p:ph idx="1"/>
-          </p:nvPr>
-        </p:nvPicPr>
-        <p:blipFill>
-          <a:blip r:embed="rId2" cstate="print">
-            <a:extLst>
-              <a:ext uri="{28A0092B-C50C-407E-A947-70E740481C1C}">
-                <a14:useLocalDpi xmlns:a14="http://schemas.microsoft.com/office/drawing/2010/main" val="0"/>
-              </a:ext>
-            </a:extLst>
-          </a:blip>
-          <a:stretch>
-            <a:fillRect/>
-          </a:stretch>
-        </p:blipFill>
-        <p:spPr>
-          <a:xfrm>
-            <a:off x="4765102" y="522342"/>
-            <a:ext cx="2661795" cy="4351338"/>
-          </a:xfrm>
-        </p:spPr>
-      </p:pic>
-      <p:sp>
-        <p:nvSpPr>
-          <p:cNvPr id="5" name="Rectangle 4"/>
-          <p:cNvSpPr/>
-          <p:nvPr/>
-        </p:nvSpPr>
-        <p:spPr>
-          <a:xfrm>
-            <a:off x="3047999" y="5030897"/>
-            <a:ext cx="6096000" cy="1200329"/>
-          </a:xfrm>
-          <a:prstGeom prst="rect">
-            <a:avLst/>
-          </a:prstGeom>
-        </p:spPr>
-        <p:txBody>
-          <a:bodyPr>
-            <a:spAutoFit/>
-          </a:bodyPr>
-          <a:lstStyle/>
-          <a:p>
-            <a:pPr algn="ctr"/>
-            <a:r>
-              <a:rPr lang="en-US" dirty="0" smtClean="0">
-                <a:latin typeface="Georgia" panose="02040502050405020303" pitchFamily="18" charset="0"/>
-              </a:rPr>
-              <a:t>The image above the card will either be of a computer, or the </a:t>
-            </a:r>
-            <a:r>
-              <a:rPr lang="en-US" smtClean="0">
-                <a:latin typeface="Georgia" panose="02040502050405020303" pitchFamily="18" charset="0"/>
-              </a:rPr>
-              <a:t>recent participant whose </a:t>
-            </a:r>
-            <a:r>
-              <a:rPr lang="en-US" dirty="0" smtClean="0">
-                <a:latin typeface="Georgia" panose="02040502050405020303" pitchFamily="18" charset="0"/>
-              </a:rPr>
-              <a:t>reward depends on your performance. When you make a guess, the question mark on the screen will turn orange, as pictured.</a:t>
-            </a:r>
-            <a:endParaRPr lang="en-US" dirty="0">
-              <a:latin typeface="Georgia" panose="02040502050405020303" pitchFamily="18" charset="0"/>
-            </a:endParaRPr>
-          </a:p>
-        </p:txBody>
-      </p:sp>
-    </p:spTree>
-    <p:extLst>
-      <p:ext uri="{BB962C8B-B14F-4D97-AF65-F5344CB8AC3E}">
-        <p14:creationId xmlns:p14="http://schemas.microsoft.com/office/powerpoint/2010/main" val="3531808893"/>
-      </p:ext>
-    </p:extLst>
-  </p:cSld>
-  <p:clrMapOvr>
-    <a:masterClrMapping/>
-  </p:clrMapOvr>
-  <p:timing>
-    <p:tnLst>
-      <p:par>
-        <p:cTn id="1" dur="indefinite" restart="never" nodeType="tmRoot"/>
-      </p:par>
-    </p:tnLst>
-  </p:timing>
-</p:sld>
-</file>
-
-<file path=ppt/slides/slide7.xml><?xml version="1.0" encoding="utf-8"?>
-<p:sld xmlns:a="http://schemas.openxmlformats.org/drawingml/2006/main" xmlns:r="http://schemas.openxmlformats.org/officeDocument/2006/relationships" xmlns:p="http://schemas.openxmlformats.org/presentationml/2006/main">
-  <p:cSld>
-    <p:spTree>
-      <p:nvGrpSpPr>
-        <p:cNvPr id="1" name=""/>
-        <p:cNvGrpSpPr/>
-        <p:nvPr/>
-      </p:nvGrpSpPr>
-      <p:grpSpPr>
-        <a:xfrm>
-          <a:off x="0" y="0"/>
-          <a:ext cx="0" cy="0"/>
-          <a:chOff x="0" y="0"/>
-          <a:chExt cx="0" cy="0"/>
-        </a:xfrm>
-      </p:grpSpPr>
-      <p:sp>
-        <p:nvSpPr>
-          <p:cNvPr id="3" name="Content Placeholder 2"/>
-          <p:cNvSpPr>
-            <a:spLocks noGrp="1"/>
-          </p:cNvSpPr>
-          <p:nvPr>
-            <p:ph idx="1"/>
-          </p:nvPr>
-        </p:nvSpPr>
-        <p:spPr>
-          <a:xfrm>
-            <a:off x="901262" y="1468272"/>
-            <a:ext cx="10515600" cy="4351338"/>
-          </a:xfrm>
-        </p:spPr>
-        <p:txBody>
-          <a:bodyPr>
-            <a:normAutofit fontScale="70000" lnSpcReduction="20000"/>
-          </a:bodyPr>
-          <a:lstStyle/>
-          <a:p>
-            <a:pPr marL="0" lvl="0" indent="0" eaLnBrk="0" fontAlgn="base" hangingPunct="0">
-              <a:lnSpc>
-                <a:spcPct val="100000"/>
-              </a:lnSpc>
-              <a:spcBef>
-                <a:spcPts val="1200"/>
-              </a:spcBef>
-              <a:spcAft>
-                <a:spcPct val="0"/>
-              </a:spcAft>
-              <a:buNone/>
-            </a:pPr>
-            <a:r>
-              <a:rPr lang="en-US" altLang="en-US" b="1" dirty="0" smtClean="0">
-                <a:latin typeface="Georgia" panose="02040502050405020303" pitchFamily="18" charset="0"/>
-              </a:rPr>
-              <a:t>Every monetary outcome on each trial of the task will be shared equally between you and your partner on the screen</a:t>
-            </a:r>
-            <a:r>
-              <a:rPr lang="en-US" altLang="en-US" dirty="0" smtClean="0">
-                <a:latin typeface="Georgia" panose="02040502050405020303" pitchFamily="18" charset="0"/>
-              </a:rPr>
-              <a:t>.</a:t>
-            </a:r>
-          </a:p>
-          <a:p>
-            <a:pPr eaLnBrk="0" fontAlgn="base" hangingPunct="0">
-              <a:lnSpc>
-                <a:spcPct val="100000"/>
-              </a:lnSpc>
-              <a:spcBef>
-                <a:spcPts val="1200"/>
-              </a:spcBef>
-              <a:spcAft>
-                <a:spcPct val="0"/>
-              </a:spcAft>
-            </a:pPr>
-            <a:r>
-              <a:rPr lang="en-US" altLang="en-US" dirty="0" smtClean="0">
-                <a:latin typeface="Georgia" panose="02040502050405020303" pitchFamily="18" charset="0"/>
-              </a:rPr>
-              <a:t>Earning $10 for guessing correctly means that you earn $5 for yourself and $5 for your partner.</a:t>
-            </a:r>
-            <a:endParaRPr lang="en-US" altLang="en-US" dirty="0">
-              <a:latin typeface="Georgia" panose="02040502050405020303" pitchFamily="18" charset="0"/>
-            </a:endParaRPr>
-          </a:p>
-          <a:p>
-            <a:pPr eaLnBrk="0" fontAlgn="base" hangingPunct="0">
-              <a:lnSpc>
-                <a:spcPct val="100000"/>
-              </a:lnSpc>
-              <a:spcBef>
-                <a:spcPts val="1200"/>
-              </a:spcBef>
-              <a:spcAft>
-                <a:spcPct val="0"/>
-              </a:spcAft>
-            </a:pPr>
-            <a:r>
-              <a:rPr lang="en-US" altLang="en-US" dirty="0" smtClean="0">
-                <a:latin typeface="Georgia" panose="02040502050405020303" pitchFamily="18" charset="0"/>
-              </a:rPr>
-              <a:t>Losing $5 for an incorrect guess means that both you and your partner will each lose $2.50.</a:t>
-            </a:r>
-          </a:p>
-          <a:p>
-            <a:pPr eaLnBrk="0" fontAlgn="base" hangingPunct="0">
-              <a:lnSpc>
-                <a:spcPct val="100000"/>
-              </a:lnSpc>
-              <a:spcBef>
-                <a:spcPts val="1200"/>
-              </a:spcBef>
-              <a:spcAft>
-                <a:spcPct val="0"/>
-              </a:spcAft>
-            </a:pPr>
-            <a:endParaRPr lang="en-US" altLang="en-US" dirty="0">
-              <a:latin typeface="Georgia" panose="02040502050405020303" pitchFamily="18" charset="0"/>
-            </a:endParaRPr>
-          </a:p>
-          <a:p>
-            <a:pPr marL="0" indent="0" eaLnBrk="0" fontAlgn="base" hangingPunct="0">
-              <a:lnSpc>
-                <a:spcPct val="100000"/>
-              </a:lnSpc>
-              <a:spcBef>
-                <a:spcPts val="1200"/>
-              </a:spcBef>
-              <a:spcAft>
-                <a:spcPct val="0"/>
-              </a:spcAft>
-              <a:buNone/>
-            </a:pPr>
-            <a:r>
-              <a:rPr lang="en-US" b="1" dirty="0">
-                <a:latin typeface="Georgia" panose="02040502050405020303" pitchFamily="18" charset="0"/>
-                <a:cs typeface="Arial" panose="020B0604020202020204" pitchFamily="34" charset="0"/>
-              </a:rPr>
-              <a:t>After you indicate your choice, you will see the actual value of the </a:t>
-            </a:r>
-            <a:r>
-              <a:rPr lang="en-US" b="1" dirty="0" smtClean="0">
-                <a:latin typeface="Georgia" panose="02040502050405020303" pitchFamily="18" charset="0"/>
-                <a:cs typeface="Arial" panose="020B0604020202020204" pitchFamily="34" charset="0"/>
-              </a:rPr>
-              <a:t>card.</a:t>
-            </a:r>
-          </a:p>
-          <a:p>
-            <a:pPr eaLnBrk="0" fontAlgn="base" hangingPunct="0">
-              <a:spcBef>
-                <a:spcPts val="1200"/>
-              </a:spcBef>
-              <a:spcAft>
-                <a:spcPct val="0"/>
-              </a:spcAft>
-            </a:pPr>
-            <a:r>
-              <a:rPr lang="en-US" dirty="0" smtClean="0">
-                <a:latin typeface="Georgia" panose="02040502050405020303" pitchFamily="18" charset="0"/>
-                <a:cs typeface="Arial" panose="020B0604020202020204" pitchFamily="34" charset="0"/>
-              </a:rPr>
-              <a:t>If </a:t>
-            </a:r>
-            <a:r>
-              <a:rPr lang="en-US" dirty="0">
-                <a:latin typeface="Georgia" panose="02040502050405020303" pitchFamily="18" charset="0"/>
-                <a:cs typeface="Arial" panose="020B0604020202020204" pitchFamily="34" charset="0"/>
-              </a:rPr>
-              <a:t>your guess was correct, you'll see a green arrow pointing up, indicating monetary </a:t>
-            </a:r>
-            <a:r>
-              <a:rPr lang="en-US" dirty="0" smtClean="0">
-                <a:latin typeface="Georgia" panose="02040502050405020303" pitchFamily="18" charset="0"/>
-                <a:cs typeface="Arial" panose="020B0604020202020204" pitchFamily="34" charset="0"/>
-              </a:rPr>
-              <a:t>gain.</a:t>
-            </a:r>
-          </a:p>
-          <a:p>
-            <a:pPr eaLnBrk="0" fontAlgn="base" hangingPunct="0">
-              <a:spcBef>
-                <a:spcPts val="1200"/>
-              </a:spcBef>
-              <a:spcAft>
-                <a:spcPct val="0"/>
-              </a:spcAft>
-            </a:pPr>
-            <a:r>
-              <a:rPr lang="en-US" dirty="0" smtClean="0">
-                <a:latin typeface="Georgia" panose="02040502050405020303" pitchFamily="18" charset="0"/>
-                <a:cs typeface="Arial" panose="020B0604020202020204" pitchFamily="34" charset="0"/>
-              </a:rPr>
-              <a:t>If </a:t>
-            </a:r>
-            <a:r>
-              <a:rPr lang="en-US" dirty="0">
-                <a:latin typeface="Georgia" panose="02040502050405020303" pitchFamily="18" charset="0"/>
-                <a:cs typeface="Arial" panose="020B0604020202020204" pitchFamily="34" charset="0"/>
-              </a:rPr>
-              <a:t>it was incorrect, you'll see a red arrow pointing down indicating a </a:t>
-            </a:r>
-            <a:r>
-              <a:rPr lang="en-US" dirty="0" smtClean="0">
-                <a:latin typeface="Georgia" panose="02040502050405020303" pitchFamily="18" charset="0"/>
-                <a:cs typeface="Arial" panose="020B0604020202020204" pitchFamily="34" charset="0"/>
-              </a:rPr>
-              <a:t>loss.</a:t>
-            </a:r>
-          </a:p>
-          <a:p>
-            <a:pPr eaLnBrk="0" fontAlgn="base" hangingPunct="0">
-              <a:spcBef>
-                <a:spcPts val="1200"/>
-              </a:spcBef>
-              <a:spcAft>
-                <a:spcPct val="0"/>
-              </a:spcAft>
-            </a:pPr>
-            <a:r>
-              <a:rPr lang="en-US" dirty="0" smtClean="0">
-                <a:latin typeface="Georgia" panose="02040502050405020303" pitchFamily="18" charset="0"/>
-                <a:cs typeface="Arial" panose="020B0604020202020204" pitchFamily="34" charset="0"/>
-              </a:rPr>
-              <a:t>If </a:t>
-            </a:r>
-            <a:r>
-              <a:rPr lang="en-US" dirty="0">
-                <a:latin typeface="Georgia" panose="02040502050405020303" pitchFamily="18" charset="0"/>
-                <a:cs typeface="Arial" panose="020B0604020202020204" pitchFamily="34" charset="0"/>
-              </a:rPr>
-              <a:t>you happen to not respond within the 2.5 seconds, you won't see anything but the value of the card, and a # sign will show on the screen.</a:t>
-            </a:r>
-            <a:endParaRPr lang="en-US" altLang="en-US" dirty="0" smtClean="0">
-              <a:latin typeface="Georgia" panose="02040502050405020303" pitchFamily="18" charset="0"/>
-              <a:cs typeface="Arial" panose="020B0604020202020204" pitchFamily="34" charset="0"/>
-            </a:endParaRPr>
-          </a:p>
-          <a:p>
-            <a:pPr marL="0" lvl="0" indent="0" eaLnBrk="0" fontAlgn="base" hangingPunct="0">
-              <a:lnSpc>
-                <a:spcPct val="100000"/>
-              </a:lnSpc>
-              <a:spcBef>
-                <a:spcPct val="0"/>
-              </a:spcBef>
-              <a:spcAft>
-                <a:spcPct val="0"/>
-              </a:spcAft>
-              <a:buNone/>
-            </a:pPr>
-            <a:endParaRPr lang="en-US" altLang="en-US" dirty="0">
-              <a:latin typeface="Georgia" panose="02040502050405020303" pitchFamily="18" charset="0"/>
-            </a:endParaRPr>
-          </a:p>
-        </p:txBody>
-      </p:sp>
-    </p:spTree>
-    <p:extLst>
-      <p:ext uri="{BB962C8B-B14F-4D97-AF65-F5344CB8AC3E}">
-        <p14:creationId xmlns:p14="http://schemas.microsoft.com/office/powerpoint/2010/main" val="1138182282"/>
-      </p:ext>
-    </p:extLst>
-  </p:cSld>
-  <p:clrMapOvr>
-    <a:masterClrMapping/>
-  </p:clrMapOvr>
-  <p:timing>
-    <p:tnLst>
-      <p:par>
-        <p:cTn id="1" dur="indefinite" restart="never" nodeType="tmRoot"/>
-      </p:par>
-    </p:tnLst>
-  </p:timing>
-</p:sld>
-</file>
-
-<file path=ppt/slides/slide8.xml><?xml version="1.0" encoding="utf-8"?>
-<p:sld xmlns:a="http://schemas.openxmlformats.org/drawingml/2006/main" xmlns:r="http://schemas.openxmlformats.org/officeDocument/2006/relationships" xmlns:p="http://schemas.openxmlformats.org/presentationml/2006/main">
-  <p:cSld>
-    <p:spTree>
-      <p:nvGrpSpPr>
-        <p:cNvPr id="1" name=""/>
-        <p:cNvGrpSpPr/>
-        <p:nvPr/>
-      </p:nvGrpSpPr>
-      <p:grpSpPr>
-        <a:xfrm>
-          <a:off x="0" y="0"/>
-          <a:ext cx="0" cy="0"/>
-          <a:chOff x="0" y="0"/>
-          <a:chExt cx="0" cy="0"/>
-        </a:xfrm>
-      </p:grpSpPr>
-      <p:pic>
-        <p:nvPicPr>
-          <p:cNvPr id="4" name="Content Placeholder 3"/>
-          <p:cNvPicPr>
-            <a:picLocks noGrp="1" noChangeAspect="1"/>
-          </p:cNvPicPr>
-          <p:nvPr>
-            <p:ph idx="1"/>
-          </p:nvPr>
-        </p:nvPicPr>
-        <p:blipFill>
-          <a:blip r:embed="rId2" cstate="print">
-            <a:extLst>
-              <a:ext uri="{28A0092B-C50C-407E-A947-70E740481C1C}">
-                <a14:useLocalDpi xmlns:a14="http://schemas.microsoft.com/office/drawing/2010/main" val="0"/>
-              </a:ext>
-            </a:extLst>
-          </a:blip>
-          <a:stretch>
-            <a:fillRect/>
-          </a:stretch>
-        </p:blipFill>
-        <p:spPr>
-          <a:xfrm>
-            <a:off x="4261979" y="754067"/>
-            <a:ext cx="3668041" cy="4351338"/>
-          </a:xfrm>
-        </p:spPr>
-      </p:pic>
-      <p:sp>
-        <p:nvSpPr>
-          <p:cNvPr id="5" name="Rectangle 4"/>
-          <p:cNvSpPr/>
-          <p:nvPr/>
-        </p:nvSpPr>
-        <p:spPr>
-          <a:xfrm>
-            <a:off x="2772736" y="5354159"/>
-            <a:ext cx="6646525" cy="1200329"/>
-          </a:xfrm>
-          <a:prstGeom prst="rect">
-            <a:avLst/>
-          </a:prstGeom>
-        </p:spPr>
-        <p:txBody>
-          <a:bodyPr wrap="square">
-            <a:spAutoFit/>
-          </a:bodyPr>
-          <a:lstStyle/>
-          <a:p>
-            <a:pPr algn="ctr"/>
-            <a:r>
-              <a:rPr lang="en-US" dirty="0" smtClean="0">
-                <a:latin typeface="Georgia" panose="02040502050405020303" pitchFamily="18" charset="0"/>
-              </a:rPr>
-              <a:t>For example, imagine you guessed ‘lower than 5’ and the card was an ‘8.’ In this case, a red down arrow would appear, meaning an incorrect guess and monetary loss of $2.50 each for you and whichever partner was on the screen.</a:t>
-            </a:r>
-            <a:endParaRPr lang="en-US" dirty="0">
-              <a:latin typeface="Georgia" panose="02040502050405020303" pitchFamily="18" charset="0"/>
-            </a:endParaRPr>
-          </a:p>
-        </p:txBody>
-      </p:sp>
-    </p:spTree>
-    <p:extLst>
-      <p:ext uri="{BB962C8B-B14F-4D97-AF65-F5344CB8AC3E}">
-        <p14:creationId xmlns:p14="http://schemas.microsoft.com/office/powerpoint/2010/main" val="713733602"/>
-      </p:ext>
-    </p:extLst>
-  </p:cSld>
-  <p:clrMapOvr>
-    <a:masterClrMapping/>
-  </p:clrMapOvr>
-  <p:timing>
-    <p:tnLst>
-      <p:par>
-        <p:cTn id="1" dur="indefinite" restart="never" nodeType="tmRoot"/>
-      </p:par>
-    </p:tnLst>
-  </p:timing>
-</p:sld>
-</file>
-
-<file path=ppt/slides/slide9.xml><?xml version="1.0" encoding="utf-8"?>
-<p:sld xmlns:a="http://schemas.openxmlformats.org/drawingml/2006/main" xmlns:r="http://schemas.openxmlformats.org/officeDocument/2006/relationships" xmlns:p="http://schemas.openxmlformats.org/presentationml/2006/main">
-  <p:cSld>
-    <p:spTree>
-      <p:nvGrpSpPr>
-        <p:cNvPr id="1" name=""/>
-        <p:cNvGrpSpPr/>
-        <p:nvPr/>
-      </p:nvGrpSpPr>
-      <p:grpSpPr>
-        <a:xfrm>
-          <a:off x="0" y="0"/>
-          <a:ext cx="0" cy="0"/>
-          <a:chOff x="0" y="0"/>
-          <a:chExt cx="0" cy="0"/>
-        </a:xfrm>
-      </p:grpSpPr>
-      <p:pic>
-        <p:nvPicPr>
-          <p:cNvPr id="4" name="Content Placeholder 3"/>
-          <p:cNvPicPr>
-            <a:picLocks noGrp="1" noChangeAspect="1"/>
-          </p:cNvPicPr>
-          <p:nvPr>
-            <p:ph idx="1"/>
-          </p:nvPr>
-        </p:nvPicPr>
-        <p:blipFill>
-          <a:blip r:embed="rId2" cstate="print">
-            <a:extLst>
-              <a:ext uri="{28A0092B-C50C-407E-A947-70E740481C1C}">
-                <a14:useLocalDpi xmlns:a14="http://schemas.microsoft.com/office/drawing/2010/main" val="0"/>
-              </a:ext>
-            </a:extLst>
-          </a:blip>
-          <a:stretch>
-            <a:fillRect/>
-          </a:stretch>
-        </p:blipFill>
-        <p:spPr>
-          <a:xfrm>
-            <a:off x="4192290" y="791666"/>
-            <a:ext cx="3807420" cy="4351338"/>
-          </a:xfrm>
-        </p:spPr>
-      </p:pic>
-      <p:sp>
-        <p:nvSpPr>
-          <p:cNvPr id="5" name="Rectangle 4"/>
-          <p:cNvSpPr/>
-          <p:nvPr/>
-        </p:nvSpPr>
-        <p:spPr>
-          <a:xfrm>
-            <a:off x="3048000" y="5347742"/>
-            <a:ext cx="6096000" cy="1200329"/>
-          </a:xfrm>
-          <a:prstGeom prst="rect">
-            <a:avLst/>
-          </a:prstGeom>
-        </p:spPr>
-        <p:txBody>
-          <a:bodyPr>
-            <a:spAutoFit/>
-          </a:bodyPr>
-          <a:lstStyle/>
-          <a:p>
-            <a:pPr algn="ctr"/>
-            <a:r>
-              <a:rPr lang="en-US" dirty="0" smtClean="0">
-                <a:latin typeface="Georgia" panose="02040502050405020303" pitchFamily="18" charset="0"/>
-              </a:rPr>
-              <a:t>If the card had been a ‘4,’ then a guess of ‘lower than 5’ would have been correct. In this case you would see a green arrow pointing up, meaning a monetary gain of </a:t>
-            </a:r>
-            <a:r>
-              <a:rPr lang="en-US" dirty="0">
-                <a:latin typeface="Georgia" panose="02040502050405020303" pitchFamily="18" charset="0"/>
-              </a:rPr>
-              <a:t>$</a:t>
-            </a:r>
-            <a:r>
-              <a:rPr lang="en-US" dirty="0" smtClean="0">
-                <a:latin typeface="Georgia" panose="02040502050405020303" pitchFamily="18" charset="0"/>
-              </a:rPr>
-              <a:t>5 each for both you and the partner on the screen</a:t>
-            </a:r>
-            <a:endParaRPr lang="en-US" dirty="0">
-              <a:latin typeface="Georgia" panose="02040502050405020303" pitchFamily="18" charset="0"/>
-            </a:endParaRPr>
-          </a:p>
-        </p:txBody>
-      </p:sp>
-    </p:spTree>
-    <p:extLst>
-      <p:ext uri="{BB962C8B-B14F-4D97-AF65-F5344CB8AC3E}">
-        <p14:creationId xmlns:p14="http://schemas.microsoft.com/office/powerpoint/2010/main" val="2264260381"/>
-      </p:ext>
-    </p:extLst>
-  </p:cSld>
-  <p:clrMapOvr>
-    <a:masterClrMapping/>
-  </p:clrMapOvr>
-  <p:timing>
-    <p:tnLst>
-      <p:par>
-        <p:cTn id="1" dur="indefinite" restart="never" nodeType="tmRoot"/>
-      </p:par>
-    </p:tnLst>
-  </p:timing>
 </p:sld>
 </file>
 

</xml_diff>